<commit_message>
Bootstrap Carousel on top of home page. Does reference to jpg in public folder work
</commit_message>
<xml_diff>
--- a/public/marketingSlides.pptx
+++ b/public/marketingSlides.pptx
@@ -3956,7 +3956,7 @@
         </p:blipFill>
         <p:spPr>
           <a:xfrm>
-            <a:off x="6417720" y="108360"/>
+            <a:off x="6109920" y="108360"/>
             <a:ext cx="1903320" cy="1903320"/>
           </a:xfrm>
           <a:prstGeom prst="rect">
@@ -6763,7 +6763,7 @@
                 <a:latin typeface="Verdana"/>
                 <a:ea typeface="DejaVu Sans"/>
               </a:rPr>
-              <a:t>We take 5% commission.</a:t>
+              <a:t>We take 5% commission from artist sales on the site.</a:t>
             </a:r>
             <a:endParaRPr b="0" lang="en-US" sz="1800" spc="-1" strike="noStrike">
               <a:solidFill>
@@ -6967,7 +6967,7 @@
         </p:nvSpPr>
         <p:spPr>
           <a:xfrm>
-            <a:off x="914400" y="1463040"/>
+            <a:off x="914400" y="1441440"/>
             <a:ext cx="7313760" cy="5679360"/>
           </a:xfrm>
           <a:prstGeom prst="rect">
@@ -7170,39 +7170,6 @@
                 <a:latin typeface="Verdana"/>
                 <a:ea typeface="DejaVu Sans"/>
               </a:rPr>
-              <a:t>Livestreaming</a:t>
-            </a:r>
-            <a:endParaRPr b="0" lang="en-US" sz="1800" spc="-1" strike="noStrike">
-              <a:solidFill>
-                <a:srgbClr val="000000"/>
-              </a:solidFill>
-              <a:uFill>
-                <a:solidFill>
-                  <a:srgbClr val="ffffff"/>
-                </a:solidFill>
-              </a:uFill>
-              <a:latin typeface="Arial"/>
-            </a:endParaRPr>
-          </a:p>
-          <a:p>
-            <a:pPr>
-              <a:lnSpc>
-                <a:spcPct val="100000"/>
-              </a:lnSpc>
-            </a:pPr>
-            <a:r>
-              <a:rPr b="0" lang="en-US" sz="2400" spc="-1" strike="noStrike">
-                <a:solidFill>
-                  <a:srgbClr val="3c2154"/>
-                </a:solidFill>
-                <a:uFill>
-                  <a:solidFill>
-                    <a:srgbClr val="ffffff"/>
-                  </a:solidFill>
-                </a:uFill>
-                <a:latin typeface="Verdana"/>
-                <a:ea typeface="DejaVu Sans"/>
-              </a:rPr>
               <a:t>Maintaining fan email notifications</a:t>
             </a:r>
             <a:endParaRPr b="0" lang="en-US" sz="1800" spc="-1" strike="noStrike">
@@ -7237,6 +7204,39 @@
                 <a:ea typeface="DejaVu Sans"/>
               </a:rPr>
               <a:t>Event rsvps </a:t>
+            </a:r>
+            <a:endParaRPr b="0" lang="en-US" sz="1800" spc="-1" strike="noStrike">
+              <a:solidFill>
+                <a:srgbClr val="000000"/>
+              </a:solidFill>
+              <a:uFill>
+                <a:solidFill>
+                  <a:srgbClr val="ffffff"/>
+                </a:solidFill>
+              </a:uFill>
+              <a:latin typeface="Arial"/>
+            </a:endParaRPr>
+          </a:p>
+          <a:p>
+            <a:pPr>
+              <a:lnSpc>
+                <a:spcPct val="100000"/>
+              </a:lnSpc>
+            </a:pPr>
+            <a:r>
+              <a:rPr b="0" lang="en-US" sz="2400" spc="-1" strike="noStrike">
+                <a:solidFill>
+                  <a:srgbClr val="3c2154"/>
+                </a:solidFill>
+                <a:uFill>
+                  <a:solidFill>
+                    <a:srgbClr val="ffffff"/>
+                  </a:solidFill>
+                </a:uFill>
+                <a:latin typeface="Verdana"/>
+                <a:ea typeface="DejaVu Sans"/>
+              </a:rPr>
+              <a:t>Premium membership</a:t>
             </a:r>
             <a:endParaRPr b="0" lang="en-US" sz="1800" spc="-1" strike="noStrike">
               <a:solidFill>

</xml_diff>

<commit_message>
Separate actors authors filmmakers movies
</commit_message>
<xml_diff>
--- a/public/marketingSlides.pptx
+++ b/public/marketingSlides.pptx
@@ -3025,7 +3025,49 @@
                 </a:uFill>
                 <a:latin typeface="Arial"/>
               </a:rPr>
-              <a:t>Click to edit the title text format</a:t>
+              <a:t>Click to </a:t>
+            </a:r>
+            <a:r>
+              <a:rPr b="0" lang="en-US" sz="4400" spc="-1" strike="noStrike">
+                <a:solidFill>
+                  <a:srgbClr val="000000"/>
+                </a:solidFill>
+                <a:uFill>
+                  <a:solidFill>
+                    <a:srgbClr val="ffffff"/>
+                  </a:solidFill>
+                </a:uFill>
+                <a:latin typeface="Arial"/>
+              </a:rPr>
+              <a:t>edit the </a:t>
+            </a:r>
+            <a:r>
+              <a:rPr b="0" lang="en-US" sz="4400" spc="-1" strike="noStrike">
+                <a:solidFill>
+                  <a:srgbClr val="000000"/>
+                </a:solidFill>
+                <a:uFill>
+                  <a:solidFill>
+                    <a:srgbClr val="ffffff"/>
+                  </a:solidFill>
+                </a:uFill>
+                <a:latin typeface="Arial"/>
+              </a:rPr>
+              <a:t>title text </a:t>
+            </a:r>
+            <a:r>
+              <a:rPr b="0" lang="en-US" sz="4400" spc="-1" strike="noStrike">
+                <a:solidFill>
+                  <a:srgbClr val="000000"/>
+                </a:solidFill>
+                <a:uFill>
+                  <a:solidFill>
+                    <a:srgbClr val="ffffff"/>
+                  </a:solidFill>
+                </a:uFill>
+                <a:latin typeface="Arial"/>
+              </a:rPr>
+              <a:t>format</a:t>
             </a:r>
             <a:endParaRPr b="0" lang="en-US" sz="4400" spc="-1" strike="noStrike">
               <a:solidFill>
@@ -3381,7 +3423,35 @@
                 </a:uFill>
                 <a:latin typeface="Arial"/>
               </a:rPr>
-              <a:t>Click to edit the title text format</a:t>
+              <a:t>Click to edit </a:t>
+            </a:r>
+            <a:r>
+              <a:rPr b="0" lang="en-US" sz="4400" spc="-1" strike="noStrike">
+                <a:solidFill>
+                  <a:srgbClr val="000000"/>
+                </a:solidFill>
+                <a:uFill>
+                  <a:solidFill>
+                    <a:srgbClr val="ffffff"/>
+                  </a:solidFill>
+                </a:uFill>
+                <a:latin typeface="Arial"/>
+              </a:rPr>
+              <a:t>the title text </a:t>
+            </a:r>
+            <a:r>
+              <a:rPr b="0" lang="en-US" sz="4400" spc="-1" strike="noStrike">
+                <a:solidFill>
+                  <a:srgbClr val="000000"/>
+                </a:solidFill>
+                <a:uFill>
+                  <a:solidFill>
+                    <a:srgbClr val="ffffff"/>
+                  </a:solidFill>
+                </a:uFill>
+                <a:latin typeface="Arial"/>
+              </a:rPr>
+              <a:t>format</a:t>
             </a:r>
             <a:endParaRPr b="0" lang="en-US" sz="4400" spc="-1" strike="noStrike">
               <a:solidFill>

</xml_diff>

<commit_message>
Delete extraneous from readme
</commit_message>
<xml_diff>
--- a/public/marketingSlides.pptx
+++ b/public/marketingSlides.pptx
@@ -4,21 +4,22 @@
   <p:sldMasterIdLst>
     <p:sldMasterId id="2147483648" r:id="rId2"/>
     <p:sldMasterId id="2147483661" r:id="rId3"/>
+    <p:sldMasterId id="2147483674" r:id="rId4"/>
   </p:sldMasterIdLst>
   <p:sldIdLst>
-    <p:sldId id="256" r:id="rId4"/>
-    <p:sldId id="257" r:id="rId5"/>
-    <p:sldId id="258" r:id="rId6"/>
-    <p:sldId id="259" r:id="rId7"/>
-    <p:sldId id="260" r:id="rId8"/>
-    <p:sldId id="261" r:id="rId9"/>
-    <p:sldId id="262" r:id="rId10"/>
-    <p:sldId id="263" r:id="rId11"/>
-    <p:sldId id="264" r:id="rId12"/>
-    <p:sldId id="265" r:id="rId13"/>
-    <p:sldId id="266" r:id="rId14"/>
-    <p:sldId id="267" r:id="rId15"/>
-    <p:sldId id="268" r:id="rId16"/>
+    <p:sldId id="256" r:id="rId5"/>
+    <p:sldId id="257" r:id="rId6"/>
+    <p:sldId id="258" r:id="rId7"/>
+    <p:sldId id="259" r:id="rId8"/>
+    <p:sldId id="260" r:id="rId9"/>
+    <p:sldId id="261" r:id="rId10"/>
+    <p:sldId id="262" r:id="rId11"/>
+    <p:sldId id="263" r:id="rId12"/>
+    <p:sldId id="264" r:id="rId13"/>
+    <p:sldId id="265" r:id="rId14"/>
+    <p:sldId id="266" r:id="rId15"/>
+    <p:sldId id="267" r:id="rId16"/>
+    <p:sldId id="268" r:id="rId17"/>
   </p:sldIdLst>
   <p:sldSz cx="10080625" cy="7559675"/>
   <p:notesSz cx="7772400" cy="10058400"/>
@@ -2128,6 +2129,409 @@
 </p:sldLayout>
 </file>
 
+<file path=ppt/slideLayouts/slideLayout25.xml><?xml version="1.0" encoding="utf-8"?>
+<p:sldLayout xmlns:a="http://schemas.openxmlformats.org/drawingml/2006/main" xmlns:p="http://schemas.openxmlformats.org/presentationml/2006/main" xmlns:r="http://schemas.openxmlformats.org/officeDocument/2006/relationships" xmlns:p14="http://schemas.microsoft.com/office/powerpoint/2010/main" xmlns:p15="http://schemas.microsoft.com/office/powerpoint/2012/main" xmlns:mc="http://schemas.openxmlformats.org/markup-compatibility/2006" type="blank" preserve="1">
+  <p:cSld name="Blank Slide">
+    <p:spTree>
+      <p:nvGrpSpPr>
+        <p:cNvPr id="1" name=""/>
+        <p:cNvGrpSpPr/>
+        <p:nvPr/>
+      </p:nvGrpSpPr>
+      <p:grpSpPr>
+        <a:xfrm>
+          <a:off x="0" y="0"/>
+          <a:ext cx="0" cy="0"/>
+          <a:chOff x="0" y="0"/>
+          <a:chExt cx="0" cy="0"/>
+        </a:xfrm>
+      </p:grpSpPr>
+    </p:spTree>
+  </p:cSld>
+</p:sldLayout>
+</file>
+
+<file path=ppt/slideLayouts/slideLayout26.xml><?xml version="1.0" encoding="utf-8"?>
+<p:sldLayout xmlns:a="http://schemas.openxmlformats.org/drawingml/2006/main" xmlns:p="http://schemas.openxmlformats.org/presentationml/2006/main" xmlns:r="http://schemas.openxmlformats.org/officeDocument/2006/relationships" xmlns:p14="http://schemas.microsoft.com/office/powerpoint/2010/main" xmlns:p15="http://schemas.microsoft.com/office/powerpoint/2012/main" xmlns:mc="http://schemas.openxmlformats.org/markup-compatibility/2006" type="tx" preserve="1">
+  <p:cSld name="Title Slide">
+    <p:spTree>
+      <p:nvGrpSpPr>
+        <p:cNvPr id="1" name=""/>
+        <p:cNvGrpSpPr/>
+        <p:nvPr/>
+      </p:nvGrpSpPr>
+      <p:grpSpPr>
+        <a:xfrm>
+          <a:off x="0" y="0"/>
+          <a:ext cx="0" cy="0"/>
+          <a:chOff x="0" y="0"/>
+          <a:chExt cx="0" cy="0"/>
+        </a:xfrm>
+      </p:grpSpPr>
+      <p:sp>
+        <p:nvSpPr>
+          <p:cNvPr id="74" name="PlaceHolder 1"/>
+          <p:cNvSpPr>
+            <a:spLocks noGrp="1"/>
+          </p:cNvSpPr>
+          <p:nvPr>
+            <p:ph type="title"/>
+          </p:nvPr>
+        </p:nvSpPr>
+        <p:spPr>
+          <a:xfrm>
+            <a:off x="504000" y="301320"/>
+            <a:ext cx="9072000" cy="1261800"/>
+          </a:xfrm>
+          <a:prstGeom prst="rect">
+            <a:avLst/>
+          </a:prstGeom>
+        </p:spPr>
+        <p:txBody>
+          <a:bodyPr lIns="0" rIns="0" tIns="0" bIns="0" anchor="ctr"/>
+          <a:p>
+            <a:pPr algn="ctr"/>
+            <a:endParaRPr b="0" lang="en-US" sz="4400" spc="-1" strike="noStrike">
+              <a:solidFill>
+                <a:srgbClr val="000000"/>
+              </a:solidFill>
+              <a:uFill>
+                <a:solidFill>
+                  <a:srgbClr val="ffffff"/>
+                </a:solidFill>
+              </a:uFill>
+              <a:latin typeface="Arial"/>
+            </a:endParaRPr>
+          </a:p>
+        </p:txBody>
+      </p:sp>
+      <p:sp>
+        <p:nvSpPr>
+          <p:cNvPr id="75" name="PlaceHolder 2"/>
+          <p:cNvSpPr>
+            <a:spLocks noGrp="1"/>
+          </p:cNvSpPr>
+          <p:nvPr>
+            <p:ph type="subTitle"/>
+          </p:nvPr>
+        </p:nvSpPr>
+        <p:spPr>
+          <a:xfrm>
+            <a:off x="504000" y="1768680"/>
+            <a:ext cx="9072000" cy="4384080"/>
+          </a:xfrm>
+          <a:prstGeom prst="rect">
+            <a:avLst/>
+          </a:prstGeom>
+        </p:spPr>
+        <p:txBody>
+          <a:bodyPr lIns="0" rIns="0" tIns="0" bIns="0" anchor="ctr"/>
+          <a:p>
+            <a:pPr algn="ctr"/>
+            <a:endParaRPr b="0" lang="en-US" sz="3200" spc="-1" strike="noStrike">
+              <a:solidFill>
+                <a:srgbClr val="000000"/>
+              </a:solidFill>
+              <a:uFill>
+                <a:solidFill>
+                  <a:srgbClr val="ffffff"/>
+                </a:solidFill>
+              </a:uFill>
+              <a:latin typeface="Arial"/>
+            </a:endParaRPr>
+          </a:p>
+        </p:txBody>
+      </p:sp>
+    </p:spTree>
+  </p:cSld>
+</p:sldLayout>
+</file>
+
+<file path=ppt/slideLayouts/slideLayout27.xml><?xml version="1.0" encoding="utf-8"?>
+<p:sldLayout xmlns:a="http://schemas.openxmlformats.org/drawingml/2006/main" xmlns:p="http://schemas.openxmlformats.org/presentationml/2006/main" xmlns:r="http://schemas.openxmlformats.org/officeDocument/2006/relationships" xmlns:p14="http://schemas.microsoft.com/office/powerpoint/2010/main" xmlns:p15="http://schemas.microsoft.com/office/powerpoint/2012/main" xmlns:mc="http://schemas.openxmlformats.org/markup-compatibility/2006" type="obj" preserve="1">
+  <p:cSld name="Title, Content">
+    <p:spTree>
+      <p:nvGrpSpPr>
+        <p:cNvPr id="1" name=""/>
+        <p:cNvGrpSpPr/>
+        <p:nvPr/>
+      </p:nvGrpSpPr>
+      <p:grpSpPr>
+        <a:xfrm>
+          <a:off x="0" y="0"/>
+          <a:ext cx="0" cy="0"/>
+          <a:chOff x="0" y="0"/>
+          <a:chExt cx="0" cy="0"/>
+        </a:xfrm>
+      </p:grpSpPr>
+      <p:sp>
+        <p:nvSpPr>
+          <p:cNvPr id="76" name="PlaceHolder 1"/>
+          <p:cNvSpPr>
+            <a:spLocks noGrp="1"/>
+          </p:cNvSpPr>
+          <p:nvPr>
+            <p:ph type="title"/>
+          </p:nvPr>
+        </p:nvSpPr>
+        <p:spPr>
+          <a:xfrm>
+            <a:off x="504000" y="301320"/>
+            <a:ext cx="9072000" cy="1261800"/>
+          </a:xfrm>
+          <a:prstGeom prst="rect">
+            <a:avLst/>
+          </a:prstGeom>
+        </p:spPr>
+        <p:txBody>
+          <a:bodyPr lIns="0" rIns="0" tIns="0" bIns="0" anchor="ctr"/>
+          <a:p>
+            <a:pPr algn="ctr"/>
+            <a:endParaRPr b="0" lang="en-US" sz="4400" spc="-1" strike="noStrike">
+              <a:solidFill>
+                <a:srgbClr val="000000"/>
+              </a:solidFill>
+              <a:uFill>
+                <a:solidFill>
+                  <a:srgbClr val="ffffff"/>
+                </a:solidFill>
+              </a:uFill>
+              <a:latin typeface="Arial"/>
+            </a:endParaRPr>
+          </a:p>
+        </p:txBody>
+      </p:sp>
+      <p:sp>
+        <p:nvSpPr>
+          <p:cNvPr id="77" name="PlaceHolder 2"/>
+          <p:cNvSpPr>
+            <a:spLocks noGrp="1"/>
+          </p:cNvSpPr>
+          <p:nvPr>
+            <p:ph type="body"/>
+          </p:nvPr>
+        </p:nvSpPr>
+        <p:spPr>
+          <a:xfrm>
+            <a:off x="504000" y="1768680"/>
+            <a:ext cx="9072000" cy="4384080"/>
+          </a:xfrm>
+          <a:prstGeom prst="rect">
+            <a:avLst/>
+          </a:prstGeom>
+        </p:spPr>
+        <p:txBody>
+          <a:bodyPr lIns="0" rIns="0" tIns="0" bIns="0"/>
+          <a:p>
+            <a:endParaRPr b="0" lang="en-US" sz="3200" spc="-1" strike="noStrike">
+              <a:solidFill>
+                <a:srgbClr val="000000"/>
+              </a:solidFill>
+              <a:uFill>
+                <a:solidFill>
+                  <a:srgbClr val="ffffff"/>
+                </a:solidFill>
+              </a:uFill>
+              <a:latin typeface="Arial"/>
+            </a:endParaRPr>
+          </a:p>
+        </p:txBody>
+      </p:sp>
+    </p:spTree>
+  </p:cSld>
+</p:sldLayout>
+</file>
+
+<file path=ppt/slideLayouts/slideLayout28.xml><?xml version="1.0" encoding="utf-8"?>
+<p:sldLayout xmlns:a="http://schemas.openxmlformats.org/drawingml/2006/main" xmlns:p="http://schemas.openxmlformats.org/presentationml/2006/main" xmlns:r="http://schemas.openxmlformats.org/officeDocument/2006/relationships" xmlns:p14="http://schemas.microsoft.com/office/powerpoint/2010/main" xmlns:p15="http://schemas.microsoft.com/office/powerpoint/2012/main" xmlns:mc="http://schemas.openxmlformats.org/markup-compatibility/2006" type="twoObj" preserve="1">
+  <p:cSld name="Title, 2 Content">
+    <p:spTree>
+      <p:nvGrpSpPr>
+        <p:cNvPr id="1" name=""/>
+        <p:cNvGrpSpPr/>
+        <p:nvPr/>
+      </p:nvGrpSpPr>
+      <p:grpSpPr>
+        <a:xfrm>
+          <a:off x="0" y="0"/>
+          <a:ext cx="0" cy="0"/>
+          <a:chOff x="0" y="0"/>
+          <a:chExt cx="0" cy="0"/>
+        </a:xfrm>
+      </p:grpSpPr>
+      <p:sp>
+        <p:nvSpPr>
+          <p:cNvPr id="78" name="PlaceHolder 1"/>
+          <p:cNvSpPr>
+            <a:spLocks noGrp="1"/>
+          </p:cNvSpPr>
+          <p:nvPr>
+            <p:ph type="title"/>
+          </p:nvPr>
+        </p:nvSpPr>
+        <p:spPr>
+          <a:xfrm>
+            <a:off x="504000" y="301320"/>
+            <a:ext cx="9072000" cy="1261800"/>
+          </a:xfrm>
+          <a:prstGeom prst="rect">
+            <a:avLst/>
+          </a:prstGeom>
+        </p:spPr>
+        <p:txBody>
+          <a:bodyPr lIns="0" rIns="0" tIns="0" bIns="0" anchor="ctr"/>
+          <a:p>
+            <a:pPr algn="ctr"/>
+            <a:endParaRPr b="0" lang="en-US" sz="4400" spc="-1" strike="noStrike">
+              <a:solidFill>
+                <a:srgbClr val="000000"/>
+              </a:solidFill>
+              <a:uFill>
+                <a:solidFill>
+                  <a:srgbClr val="ffffff"/>
+                </a:solidFill>
+              </a:uFill>
+              <a:latin typeface="Arial"/>
+            </a:endParaRPr>
+          </a:p>
+        </p:txBody>
+      </p:sp>
+      <p:sp>
+        <p:nvSpPr>
+          <p:cNvPr id="79" name="PlaceHolder 2"/>
+          <p:cNvSpPr>
+            <a:spLocks noGrp="1"/>
+          </p:cNvSpPr>
+          <p:nvPr>
+            <p:ph type="body"/>
+          </p:nvPr>
+        </p:nvSpPr>
+        <p:spPr>
+          <a:xfrm>
+            <a:off x="504000" y="1768680"/>
+            <a:ext cx="4426920" cy="4384080"/>
+          </a:xfrm>
+          <a:prstGeom prst="rect">
+            <a:avLst/>
+          </a:prstGeom>
+        </p:spPr>
+        <p:txBody>
+          <a:bodyPr lIns="0" rIns="0" tIns="0" bIns="0"/>
+          <a:p>
+            <a:endParaRPr b="0" lang="en-US" sz="3200" spc="-1" strike="noStrike">
+              <a:solidFill>
+                <a:srgbClr val="000000"/>
+              </a:solidFill>
+              <a:uFill>
+                <a:solidFill>
+                  <a:srgbClr val="ffffff"/>
+                </a:solidFill>
+              </a:uFill>
+              <a:latin typeface="Arial"/>
+            </a:endParaRPr>
+          </a:p>
+        </p:txBody>
+      </p:sp>
+      <p:sp>
+        <p:nvSpPr>
+          <p:cNvPr id="80" name="PlaceHolder 3"/>
+          <p:cNvSpPr>
+            <a:spLocks noGrp="1"/>
+          </p:cNvSpPr>
+          <p:nvPr>
+            <p:ph type="body"/>
+          </p:nvPr>
+        </p:nvSpPr>
+        <p:spPr>
+          <a:xfrm>
+            <a:off x="5152680" y="1768680"/>
+            <a:ext cx="4426920" cy="4384080"/>
+          </a:xfrm>
+          <a:prstGeom prst="rect">
+            <a:avLst/>
+          </a:prstGeom>
+        </p:spPr>
+        <p:txBody>
+          <a:bodyPr lIns="0" rIns="0" tIns="0" bIns="0"/>
+          <a:p>
+            <a:endParaRPr b="0" lang="en-US" sz="3200" spc="-1" strike="noStrike">
+              <a:solidFill>
+                <a:srgbClr val="000000"/>
+              </a:solidFill>
+              <a:uFill>
+                <a:solidFill>
+                  <a:srgbClr val="ffffff"/>
+                </a:solidFill>
+              </a:uFill>
+              <a:latin typeface="Arial"/>
+            </a:endParaRPr>
+          </a:p>
+        </p:txBody>
+      </p:sp>
+    </p:spTree>
+  </p:cSld>
+</p:sldLayout>
+</file>
+
+<file path=ppt/slideLayouts/slideLayout29.xml><?xml version="1.0" encoding="utf-8"?>
+<p:sldLayout xmlns:a="http://schemas.openxmlformats.org/drawingml/2006/main" xmlns:p="http://schemas.openxmlformats.org/presentationml/2006/main" xmlns:r="http://schemas.openxmlformats.org/officeDocument/2006/relationships" xmlns:p14="http://schemas.microsoft.com/office/powerpoint/2010/main" xmlns:p15="http://schemas.microsoft.com/office/powerpoint/2012/main" xmlns:mc="http://schemas.openxmlformats.org/markup-compatibility/2006" type="titleOnly" preserve="1">
+  <p:cSld name="Title Only">
+    <p:spTree>
+      <p:nvGrpSpPr>
+        <p:cNvPr id="1" name=""/>
+        <p:cNvGrpSpPr/>
+        <p:nvPr/>
+      </p:nvGrpSpPr>
+      <p:grpSpPr>
+        <a:xfrm>
+          <a:off x="0" y="0"/>
+          <a:ext cx="0" cy="0"/>
+          <a:chOff x="0" y="0"/>
+          <a:chExt cx="0" cy="0"/>
+        </a:xfrm>
+      </p:grpSpPr>
+      <p:sp>
+        <p:nvSpPr>
+          <p:cNvPr id="81" name="PlaceHolder 1"/>
+          <p:cNvSpPr>
+            <a:spLocks noGrp="1"/>
+          </p:cNvSpPr>
+          <p:nvPr>
+            <p:ph type="title"/>
+          </p:nvPr>
+        </p:nvSpPr>
+        <p:spPr>
+          <a:xfrm>
+            <a:off x="504000" y="301320"/>
+            <a:ext cx="9072000" cy="1261800"/>
+          </a:xfrm>
+          <a:prstGeom prst="rect">
+            <a:avLst/>
+          </a:prstGeom>
+        </p:spPr>
+        <p:txBody>
+          <a:bodyPr lIns="0" rIns="0" tIns="0" bIns="0" anchor="ctr"/>
+          <a:p>
+            <a:pPr algn="ctr"/>
+            <a:endParaRPr b="0" lang="en-US" sz="4400" spc="-1" strike="noStrike">
+              <a:solidFill>
+                <a:srgbClr val="000000"/>
+              </a:solidFill>
+              <a:uFill>
+                <a:solidFill>
+                  <a:srgbClr val="ffffff"/>
+                </a:solidFill>
+              </a:uFill>
+              <a:latin typeface="Arial"/>
+            </a:endParaRPr>
+          </a:p>
+        </p:txBody>
+      </p:sp>
+    </p:spTree>
+  </p:cSld>
+</p:sldLayout>
+</file>
+
 <file path=ppt/slideLayouts/slideLayout3.xml><?xml version="1.0" encoding="utf-8"?>
 <p:sldLayout xmlns:a="http://schemas.openxmlformats.org/drawingml/2006/main" xmlns:p="http://schemas.openxmlformats.org/presentationml/2006/main" xmlns:r="http://schemas.openxmlformats.org/officeDocument/2006/relationships" xmlns:p14="http://schemas.microsoft.com/office/powerpoint/2010/main" xmlns:p15="http://schemas.microsoft.com/office/powerpoint/2012/main" xmlns:mc="http://schemas.openxmlformats.org/markup-compatibility/2006" type="obj" preserve="1">
   <p:cSld name="Title, Content">
@@ -2218,6 +2622,1077 @@
           </a:p>
         </p:txBody>
       </p:sp>
+    </p:spTree>
+  </p:cSld>
+</p:sldLayout>
+</file>
+
+<file path=ppt/slideLayouts/slideLayout30.xml><?xml version="1.0" encoding="utf-8"?>
+<p:sldLayout xmlns:a="http://schemas.openxmlformats.org/drawingml/2006/main" xmlns:p="http://schemas.openxmlformats.org/presentationml/2006/main" xmlns:r="http://schemas.openxmlformats.org/officeDocument/2006/relationships" xmlns:p14="http://schemas.microsoft.com/office/powerpoint/2010/main" xmlns:p15="http://schemas.microsoft.com/office/powerpoint/2012/main" xmlns:mc="http://schemas.openxmlformats.org/markup-compatibility/2006" type="objOnly" preserve="1">
+  <p:cSld name="Centered Text">
+    <p:spTree>
+      <p:nvGrpSpPr>
+        <p:cNvPr id="1" name=""/>
+        <p:cNvGrpSpPr/>
+        <p:nvPr/>
+      </p:nvGrpSpPr>
+      <p:grpSpPr>
+        <a:xfrm>
+          <a:off x="0" y="0"/>
+          <a:ext cx="0" cy="0"/>
+          <a:chOff x="0" y="0"/>
+          <a:chExt cx="0" cy="0"/>
+        </a:xfrm>
+      </p:grpSpPr>
+      <p:sp>
+        <p:nvSpPr>
+          <p:cNvPr id="82" name="PlaceHolder 1"/>
+          <p:cNvSpPr>
+            <a:spLocks noGrp="1"/>
+          </p:cNvSpPr>
+          <p:nvPr>
+            <p:ph type="subTitle"/>
+          </p:nvPr>
+        </p:nvSpPr>
+        <p:spPr>
+          <a:xfrm>
+            <a:off x="504000" y="301320"/>
+            <a:ext cx="9072000" cy="5850360"/>
+          </a:xfrm>
+          <a:prstGeom prst="rect">
+            <a:avLst/>
+          </a:prstGeom>
+        </p:spPr>
+        <p:txBody>
+          <a:bodyPr lIns="0" rIns="0" tIns="0" bIns="0" anchor="ctr"/>
+          <a:p>
+            <a:pPr algn="ctr"/>
+            <a:endParaRPr b="0" lang="en-US" sz="3200" spc="-1" strike="noStrike">
+              <a:solidFill>
+                <a:srgbClr val="000000"/>
+              </a:solidFill>
+              <a:uFill>
+                <a:solidFill>
+                  <a:srgbClr val="ffffff"/>
+                </a:solidFill>
+              </a:uFill>
+              <a:latin typeface="Arial"/>
+            </a:endParaRPr>
+          </a:p>
+        </p:txBody>
+      </p:sp>
+    </p:spTree>
+  </p:cSld>
+</p:sldLayout>
+</file>
+
+<file path=ppt/slideLayouts/slideLayout31.xml><?xml version="1.0" encoding="utf-8"?>
+<p:sldLayout xmlns:a="http://schemas.openxmlformats.org/drawingml/2006/main" xmlns:p="http://schemas.openxmlformats.org/presentationml/2006/main" xmlns:r="http://schemas.openxmlformats.org/officeDocument/2006/relationships" xmlns:p14="http://schemas.microsoft.com/office/powerpoint/2010/main" xmlns:p15="http://schemas.microsoft.com/office/powerpoint/2012/main" xmlns:mc="http://schemas.openxmlformats.org/markup-compatibility/2006" type="twoObjAndObj" preserve="1">
+  <p:cSld name="Title, 2 Content and Content">
+    <p:spTree>
+      <p:nvGrpSpPr>
+        <p:cNvPr id="1" name=""/>
+        <p:cNvGrpSpPr/>
+        <p:nvPr/>
+      </p:nvGrpSpPr>
+      <p:grpSpPr>
+        <a:xfrm>
+          <a:off x="0" y="0"/>
+          <a:ext cx="0" cy="0"/>
+          <a:chOff x="0" y="0"/>
+          <a:chExt cx="0" cy="0"/>
+        </a:xfrm>
+      </p:grpSpPr>
+      <p:sp>
+        <p:nvSpPr>
+          <p:cNvPr id="83" name="PlaceHolder 1"/>
+          <p:cNvSpPr>
+            <a:spLocks noGrp="1"/>
+          </p:cNvSpPr>
+          <p:nvPr>
+            <p:ph type="title"/>
+          </p:nvPr>
+        </p:nvSpPr>
+        <p:spPr>
+          <a:xfrm>
+            <a:off x="504000" y="301320"/>
+            <a:ext cx="9072000" cy="1261800"/>
+          </a:xfrm>
+          <a:prstGeom prst="rect">
+            <a:avLst/>
+          </a:prstGeom>
+        </p:spPr>
+        <p:txBody>
+          <a:bodyPr lIns="0" rIns="0" tIns="0" bIns="0" anchor="ctr"/>
+          <a:p>
+            <a:pPr algn="ctr"/>
+            <a:endParaRPr b="0" lang="en-US" sz="4400" spc="-1" strike="noStrike">
+              <a:solidFill>
+                <a:srgbClr val="000000"/>
+              </a:solidFill>
+              <a:uFill>
+                <a:solidFill>
+                  <a:srgbClr val="ffffff"/>
+                </a:solidFill>
+              </a:uFill>
+              <a:latin typeface="Arial"/>
+            </a:endParaRPr>
+          </a:p>
+        </p:txBody>
+      </p:sp>
+      <p:sp>
+        <p:nvSpPr>
+          <p:cNvPr id="84" name="PlaceHolder 2"/>
+          <p:cNvSpPr>
+            <a:spLocks noGrp="1"/>
+          </p:cNvSpPr>
+          <p:nvPr>
+            <p:ph type="body"/>
+          </p:nvPr>
+        </p:nvSpPr>
+        <p:spPr>
+          <a:xfrm>
+            <a:off x="504000" y="1768680"/>
+            <a:ext cx="4426920" cy="2090880"/>
+          </a:xfrm>
+          <a:prstGeom prst="rect">
+            <a:avLst/>
+          </a:prstGeom>
+        </p:spPr>
+        <p:txBody>
+          <a:bodyPr lIns="0" rIns="0" tIns="0" bIns="0"/>
+          <a:p>
+            <a:endParaRPr b="0" lang="en-US" sz="3200" spc="-1" strike="noStrike">
+              <a:solidFill>
+                <a:srgbClr val="000000"/>
+              </a:solidFill>
+              <a:uFill>
+                <a:solidFill>
+                  <a:srgbClr val="ffffff"/>
+                </a:solidFill>
+              </a:uFill>
+              <a:latin typeface="Arial"/>
+            </a:endParaRPr>
+          </a:p>
+        </p:txBody>
+      </p:sp>
+      <p:sp>
+        <p:nvSpPr>
+          <p:cNvPr id="85" name="PlaceHolder 3"/>
+          <p:cNvSpPr>
+            <a:spLocks noGrp="1"/>
+          </p:cNvSpPr>
+          <p:nvPr>
+            <p:ph type="body"/>
+          </p:nvPr>
+        </p:nvSpPr>
+        <p:spPr>
+          <a:xfrm>
+            <a:off x="504000" y="4058640"/>
+            <a:ext cx="4426920" cy="2090880"/>
+          </a:xfrm>
+          <a:prstGeom prst="rect">
+            <a:avLst/>
+          </a:prstGeom>
+        </p:spPr>
+        <p:txBody>
+          <a:bodyPr lIns="0" rIns="0" tIns="0" bIns="0"/>
+          <a:p>
+            <a:endParaRPr b="0" lang="en-US" sz="3200" spc="-1" strike="noStrike">
+              <a:solidFill>
+                <a:srgbClr val="000000"/>
+              </a:solidFill>
+              <a:uFill>
+                <a:solidFill>
+                  <a:srgbClr val="ffffff"/>
+                </a:solidFill>
+              </a:uFill>
+              <a:latin typeface="Arial"/>
+            </a:endParaRPr>
+          </a:p>
+        </p:txBody>
+      </p:sp>
+      <p:sp>
+        <p:nvSpPr>
+          <p:cNvPr id="86" name="PlaceHolder 4"/>
+          <p:cNvSpPr>
+            <a:spLocks noGrp="1"/>
+          </p:cNvSpPr>
+          <p:nvPr>
+            <p:ph type="body"/>
+          </p:nvPr>
+        </p:nvSpPr>
+        <p:spPr>
+          <a:xfrm>
+            <a:off x="5152680" y="1768680"/>
+            <a:ext cx="4426920" cy="4384080"/>
+          </a:xfrm>
+          <a:prstGeom prst="rect">
+            <a:avLst/>
+          </a:prstGeom>
+        </p:spPr>
+        <p:txBody>
+          <a:bodyPr lIns="0" rIns="0" tIns="0" bIns="0"/>
+          <a:p>
+            <a:endParaRPr b="0" lang="en-US" sz="3200" spc="-1" strike="noStrike">
+              <a:solidFill>
+                <a:srgbClr val="000000"/>
+              </a:solidFill>
+              <a:uFill>
+                <a:solidFill>
+                  <a:srgbClr val="ffffff"/>
+                </a:solidFill>
+              </a:uFill>
+              <a:latin typeface="Arial"/>
+            </a:endParaRPr>
+          </a:p>
+        </p:txBody>
+      </p:sp>
+    </p:spTree>
+  </p:cSld>
+</p:sldLayout>
+</file>
+
+<file path=ppt/slideLayouts/slideLayout32.xml><?xml version="1.0" encoding="utf-8"?>
+<p:sldLayout xmlns:a="http://schemas.openxmlformats.org/drawingml/2006/main" xmlns:p="http://schemas.openxmlformats.org/presentationml/2006/main" xmlns:r="http://schemas.openxmlformats.org/officeDocument/2006/relationships" xmlns:p14="http://schemas.microsoft.com/office/powerpoint/2010/main" xmlns:p15="http://schemas.microsoft.com/office/powerpoint/2012/main" xmlns:mc="http://schemas.openxmlformats.org/markup-compatibility/2006" type="objAndTwoObj" preserve="1">
+  <p:cSld name="Title Content and 2 Content">
+    <p:spTree>
+      <p:nvGrpSpPr>
+        <p:cNvPr id="1" name=""/>
+        <p:cNvGrpSpPr/>
+        <p:nvPr/>
+      </p:nvGrpSpPr>
+      <p:grpSpPr>
+        <a:xfrm>
+          <a:off x="0" y="0"/>
+          <a:ext cx="0" cy="0"/>
+          <a:chOff x="0" y="0"/>
+          <a:chExt cx="0" cy="0"/>
+        </a:xfrm>
+      </p:grpSpPr>
+      <p:sp>
+        <p:nvSpPr>
+          <p:cNvPr id="87" name="PlaceHolder 1"/>
+          <p:cNvSpPr>
+            <a:spLocks noGrp="1"/>
+          </p:cNvSpPr>
+          <p:nvPr>
+            <p:ph type="title"/>
+          </p:nvPr>
+        </p:nvSpPr>
+        <p:spPr>
+          <a:xfrm>
+            <a:off x="504000" y="301320"/>
+            <a:ext cx="9072000" cy="1261800"/>
+          </a:xfrm>
+          <a:prstGeom prst="rect">
+            <a:avLst/>
+          </a:prstGeom>
+        </p:spPr>
+        <p:txBody>
+          <a:bodyPr lIns="0" rIns="0" tIns="0" bIns="0" anchor="ctr"/>
+          <a:p>
+            <a:pPr algn="ctr"/>
+            <a:endParaRPr b="0" lang="en-US" sz="4400" spc="-1" strike="noStrike">
+              <a:solidFill>
+                <a:srgbClr val="000000"/>
+              </a:solidFill>
+              <a:uFill>
+                <a:solidFill>
+                  <a:srgbClr val="ffffff"/>
+                </a:solidFill>
+              </a:uFill>
+              <a:latin typeface="Arial"/>
+            </a:endParaRPr>
+          </a:p>
+        </p:txBody>
+      </p:sp>
+      <p:sp>
+        <p:nvSpPr>
+          <p:cNvPr id="88" name="PlaceHolder 2"/>
+          <p:cNvSpPr>
+            <a:spLocks noGrp="1"/>
+          </p:cNvSpPr>
+          <p:nvPr>
+            <p:ph type="body"/>
+          </p:nvPr>
+        </p:nvSpPr>
+        <p:spPr>
+          <a:xfrm>
+            <a:off x="504000" y="1768680"/>
+            <a:ext cx="4426920" cy="4384080"/>
+          </a:xfrm>
+          <a:prstGeom prst="rect">
+            <a:avLst/>
+          </a:prstGeom>
+        </p:spPr>
+        <p:txBody>
+          <a:bodyPr lIns="0" rIns="0" tIns="0" bIns="0"/>
+          <a:p>
+            <a:endParaRPr b="0" lang="en-US" sz="3200" spc="-1" strike="noStrike">
+              <a:solidFill>
+                <a:srgbClr val="000000"/>
+              </a:solidFill>
+              <a:uFill>
+                <a:solidFill>
+                  <a:srgbClr val="ffffff"/>
+                </a:solidFill>
+              </a:uFill>
+              <a:latin typeface="Arial"/>
+            </a:endParaRPr>
+          </a:p>
+        </p:txBody>
+      </p:sp>
+      <p:sp>
+        <p:nvSpPr>
+          <p:cNvPr id="89" name="PlaceHolder 3"/>
+          <p:cNvSpPr>
+            <a:spLocks noGrp="1"/>
+          </p:cNvSpPr>
+          <p:nvPr>
+            <p:ph type="body"/>
+          </p:nvPr>
+        </p:nvSpPr>
+        <p:spPr>
+          <a:xfrm>
+            <a:off x="5152680" y="1768680"/>
+            <a:ext cx="4426920" cy="2090880"/>
+          </a:xfrm>
+          <a:prstGeom prst="rect">
+            <a:avLst/>
+          </a:prstGeom>
+        </p:spPr>
+        <p:txBody>
+          <a:bodyPr lIns="0" rIns="0" tIns="0" bIns="0"/>
+          <a:p>
+            <a:endParaRPr b="0" lang="en-US" sz="3200" spc="-1" strike="noStrike">
+              <a:solidFill>
+                <a:srgbClr val="000000"/>
+              </a:solidFill>
+              <a:uFill>
+                <a:solidFill>
+                  <a:srgbClr val="ffffff"/>
+                </a:solidFill>
+              </a:uFill>
+              <a:latin typeface="Arial"/>
+            </a:endParaRPr>
+          </a:p>
+        </p:txBody>
+      </p:sp>
+      <p:sp>
+        <p:nvSpPr>
+          <p:cNvPr id="90" name="PlaceHolder 4"/>
+          <p:cNvSpPr>
+            <a:spLocks noGrp="1"/>
+          </p:cNvSpPr>
+          <p:nvPr>
+            <p:ph type="body"/>
+          </p:nvPr>
+        </p:nvSpPr>
+        <p:spPr>
+          <a:xfrm>
+            <a:off x="5152680" y="4058640"/>
+            <a:ext cx="4426920" cy="2090880"/>
+          </a:xfrm>
+          <a:prstGeom prst="rect">
+            <a:avLst/>
+          </a:prstGeom>
+        </p:spPr>
+        <p:txBody>
+          <a:bodyPr lIns="0" rIns="0" tIns="0" bIns="0"/>
+          <a:p>
+            <a:endParaRPr b="0" lang="en-US" sz="3200" spc="-1" strike="noStrike">
+              <a:solidFill>
+                <a:srgbClr val="000000"/>
+              </a:solidFill>
+              <a:uFill>
+                <a:solidFill>
+                  <a:srgbClr val="ffffff"/>
+                </a:solidFill>
+              </a:uFill>
+              <a:latin typeface="Arial"/>
+            </a:endParaRPr>
+          </a:p>
+        </p:txBody>
+      </p:sp>
+    </p:spTree>
+  </p:cSld>
+</p:sldLayout>
+</file>
+
+<file path=ppt/slideLayouts/slideLayout33.xml><?xml version="1.0" encoding="utf-8"?>
+<p:sldLayout xmlns:a="http://schemas.openxmlformats.org/drawingml/2006/main" xmlns:p="http://schemas.openxmlformats.org/presentationml/2006/main" xmlns:r="http://schemas.openxmlformats.org/officeDocument/2006/relationships" xmlns:p14="http://schemas.microsoft.com/office/powerpoint/2010/main" xmlns:p15="http://schemas.microsoft.com/office/powerpoint/2012/main" xmlns:mc="http://schemas.openxmlformats.org/markup-compatibility/2006" type="twoObjOverTx" preserve="1">
+  <p:cSld name="Title, 2 Content over Content">
+    <p:spTree>
+      <p:nvGrpSpPr>
+        <p:cNvPr id="1" name=""/>
+        <p:cNvGrpSpPr/>
+        <p:nvPr/>
+      </p:nvGrpSpPr>
+      <p:grpSpPr>
+        <a:xfrm>
+          <a:off x="0" y="0"/>
+          <a:ext cx="0" cy="0"/>
+          <a:chOff x="0" y="0"/>
+          <a:chExt cx="0" cy="0"/>
+        </a:xfrm>
+      </p:grpSpPr>
+      <p:sp>
+        <p:nvSpPr>
+          <p:cNvPr id="91" name="PlaceHolder 1"/>
+          <p:cNvSpPr>
+            <a:spLocks noGrp="1"/>
+          </p:cNvSpPr>
+          <p:nvPr>
+            <p:ph type="title"/>
+          </p:nvPr>
+        </p:nvSpPr>
+        <p:spPr>
+          <a:xfrm>
+            <a:off x="504000" y="301320"/>
+            <a:ext cx="9072000" cy="1261800"/>
+          </a:xfrm>
+          <a:prstGeom prst="rect">
+            <a:avLst/>
+          </a:prstGeom>
+        </p:spPr>
+        <p:txBody>
+          <a:bodyPr lIns="0" rIns="0" tIns="0" bIns="0" anchor="ctr"/>
+          <a:p>
+            <a:pPr algn="ctr"/>
+            <a:endParaRPr b="0" lang="en-US" sz="4400" spc="-1" strike="noStrike">
+              <a:solidFill>
+                <a:srgbClr val="000000"/>
+              </a:solidFill>
+              <a:uFill>
+                <a:solidFill>
+                  <a:srgbClr val="ffffff"/>
+                </a:solidFill>
+              </a:uFill>
+              <a:latin typeface="Arial"/>
+            </a:endParaRPr>
+          </a:p>
+        </p:txBody>
+      </p:sp>
+      <p:sp>
+        <p:nvSpPr>
+          <p:cNvPr id="92" name="PlaceHolder 2"/>
+          <p:cNvSpPr>
+            <a:spLocks noGrp="1"/>
+          </p:cNvSpPr>
+          <p:nvPr>
+            <p:ph type="body"/>
+          </p:nvPr>
+        </p:nvSpPr>
+        <p:spPr>
+          <a:xfrm>
+            <a:off x="504000" y="1768680"/>
+            <a:ext cx="4426920" cy="2090880"/>
+          </a:xfrm>
+          <a:prstGeom prst="rect">
+            <a:avLst/>
+          </a:prstGeom>
+        </p:spPr>
+        <p:txBody>
+          <a:bodyPr lIns="0" rIns="0" tIns="0" bIns="0"/>
+          <a:p>
+            <a:endParaRPr b="0" lang="en-US" sz="3200" spc="-1" strike="noStrike">
+              <a:solidFill>
+                <a:srgbClr val="000000"/>
+              </a:solidFill>
+              <a:uFill>
+                <a:solidFill>
+                  <a:srgbClr val="ffffff"/>
+                </a:solidFill>
+              </a:uFill>
+              <a:latin typeface="Arial"/>
+            </a:endParaRPr>
+          </a:p>
+        </p:txBody>
+      </p:sp>
+      <p:sp>
+        <p:nvSpPr>
+          <p:cNvPr id="93" name="PlaceHolder 3"/>
+          <p:cNvSpPr>
+            <a:spLocks noGrp="1"/>
+          </p:cNvSpPr>
+          <p:nvPr>
+            <p:ph type="body"/>
+          </p:nvPr>
+        </p:nvSpPr>
+        <p:spPr>
+          <a:xfrm>
+            <a:off x="5152680" y="1768680"/>
+            <a:ext cx="4426920" cy="2090880"/>
+          </a:xfrm>
+          <a:prstGeom prst="rect">
+            <a:avLst/>
+          </a:prstGeom>
+        </p:spPr>
+        <p:txBody>
+          <a:bodyPr lIns="0" rIns="0" tIns="0" bIns="0"/>
+          <a:p>
+            <a:endParaRPr b="0" lang="en-US" sz="3200" spc="-1" strike="noStrike">
+              <a:solidFill>
+                <a:srgbClr val="000000"/>
+              </a:solidFill>
+              <a:uFill>
+                <a:solidFill>
+                  <a:srgbClr val="ffffff"/>
+                </a:solidFill>
+              </a:uFill>
+              <a:latin typeface="Arial"/>
+            </a:endParaRPr>
+          </a:p>
+        </p:txBody>
+      </p:sp>
+      <p:sp>
+        <p:nvSpPr>
+          <p:cNvPr id="94" name="PlaceHolder 4"/>
+          <p:cNvSpPr>
+            <a:spLocks noGrp="1"/>
+          </p:cNvSpPr>
+          <p:nvPr>
+            <p:ph type="body"/>
+          </p:nvPr>
+        </p:nvSpPr>
+        <p:spPr>
+          <a:xfrm>
+            <a:off x="504000" y="4058640"/>
+            <a:ext cx="9072000" cy="2090880"/>
+          </a:xfrm>
+          <a:prstGeom prst="rect">
+            <a:avLst/>
+          </a:prstGeom>
+        </p:spPr>
+        <p:txBody>
+          <a:bodyPr lIns="0" rIns="0" tIns="0" bIns="0"/>
+          <a:p>
+            <a:endParaRPr b="0" lang="en-US" sz="3200" spc="-1" strike="noStrike">
+              <a:solidFill>
+                <a:srgbClr val="000000"/>
+              </a:solidFill>
+              <a:uFill>
+                <a:solidFill>
+                  <a:srgbClr val="ffffff"/>
+                </a:solidFill>
+              </a:uFill>
+              <a:latin typeface="Arial"/>
+            </a:endParaRPr>
+          </a:p>
+        </p:txBody>
+      </p:sp>
+    </p:spTree>
+  </p:cSld>
+</p:sldLayout>
+</file>
+
+<file path=ppt/slideLayouts/slideLayout34.xml><?xml version="1.0" encoding="utf-8"?>
+<p:sldLayout xmlns:a="http://schemas.openxmlformats.org/drawingml/2006/main" xmlns:p="http://schemas.openxmlformats.org/presentationml/2006/main" xmlns:r="http://schemas.openxmlformats.org/officeDocument/2006/relationships" xmlns:p14="http://schemas.microsoft.com/office/powerpoint/2010/main" xmlns:p15="http://schemas.microsoft.com/office/powerpoint/2012/main" xmlns:mc="http://schemas.openxmlformats.org/markup-compatibility/2006" type="objOverTx" preserve="1">
+  <p:cSld name="Title, Content over Content">
+    <p:spTree>
+      <p:nvGrpSpPr>
+        <p:cNvPr id="1" name=""/>
+        <p:cNvGrpSpPr/>
+        <p:nvPr/>
+      </p:nvGrpSpPr>
+      <p:grpSpPr>
+        <a:xfrm>
+          <a:off x="0" y="0"/>
+          <a:ext cx="0" cy="0"/>
+          <a:chOff x="0" y="0"/>
+          <a:chExt cx="0" cy="0"/>
+        </a:xfrm>
+      </p:grpSpPr>
+      <p:sp>
+        <p:nvSpPr>
+          <p:cNvPr id="95" name="PlaceHolder 1"/>
+          <p:cNvSpPr>
+            <a:spLocks noGrp="1"/>
+          </p:cNvSpPr>
+          <p:nvPr>
+            <p:ph type="title"/>
+          </p:nvPr>
+        </p:nvSpPr>
+        <p:spPr>
+          <a:xfrm>
+            <a:off x="504000" y="301320"/>
+            <a:ext cx="9072000" cy="1261800"/>
+          </a:xfrm>
+          <a:prstGeom prst="rect">
+            <a:avLst/>
+          </a:prstGeom>
+        </p:spPr>
+        <p:txBody>
+          <a:bodyPr lIns="0" rIns="0" tIns="0" bIns="0" anchor="ctr"/>
+          <a:p>
+            <a:pPr algn="ctr"/>
+            <a:endParaRPr b="0" lang="en-US" sz="4400" spc="-1" strike="noStrike">
+              <a:solidFill>
+                <a:srgbClr val="000000"/>
+              </a:solidFill>
+              <a:uFill>
+                <a:solidFill>
+                  <a:srgbClr val="ffffff"/>
+                </a:solidFill>
+              </a:uFill>
+              <a:latin typeface="Arial"/>
+            </a:endParaRPr>
+          </a:p>
+        </p:txBody>
+      </p:sp>
+      <p:sp>
+        <p:nvSpPr>
+          <p:cNvPr id="96" name="PlaceHolder 2"/>
+          <p:cNvSpPr>
+            <a:spLocks noGrp="1"/>
+          </p:cNvSpPr>
+          <p:nvPr>
+            <p:ph type="body"/>
+          </p:nvPr>
+        </p:nvSpPr>
+        <p:spPr>
+          <a:xfrm>
+            <a:off x="504000" y="1768680"/>
+            <a:ext cx="9072000" cy="2090880"/>
+          </a:xfrm>
+          <a:prstGeom prst="rect">
+            <a:avLst/>
+          </a:prstGeom>
+        </p:spPr>
+        <p:txBody>
+          <a:bodyPr lIns="0" rIns="0" tIns="0" bIns="0"/>
+          <a:p>
+            <a:endParaRPr b="0" lang="en-US" sz="3200" spc="-1" strike="noStrike">
+              <a:solidFill>
+                <a:srgbClr val="000000"/>
+              </a:solidFill>
+              <a:uFill>
+                <a:solidFill>
+                  <a:srgbClr val="ffffff"/>
+                </a:solidFill>
+              </a:uFill>
+              <a:latin typeface="Arial"/>
+            </a:endParaRPr>
+          </a:p>
+        </p:txBody>
+      </p:sp>
+      <p:sp>
+        <p:nvSpPr>
+          <p:cNvPr id="97" name="PlaceHolder 3"/>
+          <p:cNvSpPr>
+            <a:spLocks noGrp="1"/>
+          </p:cNvSpPr>
+          <p:nvPr>
+            <p:ph type="body"/>
+          </p:nvPr>
+        </p:nvSpPr>
+        <p:spPr>
+          <a:xfrm>
+            <a:off x="504000" y="4058640"/>
+            <a:ext cx="9072000" cy="2090880"/>
+          </a:xfrm>
+          <a:prstGeom prst="rect">
+            <a:avLst/>
+          </a:prstGeom>
+        </p:spPr>
+        <p:txBody>
+          <a:bodyPr lIns="0" rIns="0" tIns="0" bIns="0"/>
+          <a:p>
+            <a:endParaRPr b="0" lang="en-US" sz="3200" spc="-1" strike="noStrike">
+              <a:solidFill>
+                <a:srgbClr val="000000"/>
+              </a:solidFill>
+              <a:uFill>
+                <a:solidFill>
+                  <a:srgbClr val="ffffff"/>
+                </a:solidFill>
+              </a:uFill>
+              <a:latin typeface="Arial"/>
+            </a:endParaRPr>
+          </a:p>
+        </p:txBody>
+      </p:sp>
+    </p:spTree>
+  </p:cSld>
+</p:sldLayout>
+</file>
+
+<file path=ppt/slideLayouts/slideLayout35.xml><?xml version="1.0" encoding="utf-8"?>
+<p:sldLayout xmlns:a="http://schemas.openxmlformats.org/drawingml/2006/main" xmlns:p="http://schemas.openxmlformats.org/presentationml/2006/main" xmlns:r="http://schemas.openxmlformats.org/officeDocument/2006/relationships" xmlns:p14="http://schemas.microsoft.com/office/powerpoint/2010/main" xmlns:p15="http://schemas.microsoft.com/office/powerpoint/2012/main" xmlns:mc="http://schemas.openxmlformats.org/markup-compatibility/2006" type="fourObj" preserve="1">
+  <p:cSld name="Title, 4 Content">
+    <p:spTree>
+      <p:nvGrpSpPr>
+        <p:cNvPr id="1" name=""/>
+        <p:cNvGrpSpPr/>
+        <p:nvPr/>
+      </p:nvGrpSpPr>
+      <p:grpSpPr>
+        <a:xfrm>
+          <a:off x="0" y="0"/>
+          <a:ext cx="0" cy="0"/>
+          <a:chOff x="0" y="0"/>
+          <a:chExt cx="0" cy="0"/>
+        </a:xfrm>
+      </p:grpSpPr>
+      <p:sp>
+        <p:nvSpPr>
+          <p:cNvPr id="98" name="PlaceHolder 1"/>
+          <p:cNvSpPr>
+            <a:spLocks noGrp="1"/>
+          </p:cNvSpPr>
+          <p:nvPr>
+            <p:ph type="title"/>
+          </p:nvPr>
+        </p:nvSpPr>
+        <p:spPr>
+          <a:xfrm>
+            <a:off x="504000" y="301320"/>
+            <a:ext cx="9072000" cy="1261800"/>
+          </a:xfrm>
+          <a:prstGeom prst="rect">
+            <a:avLst/>
+          </a:prstGeom>
+        </p:spPr>
+        <p:txBody>
+          <a:bodyPr lIns="0" rIns="0" tIns="0" bIns="0" anchor="ctr"/>
+          <a:p>
+            <a:pPr algn="ctr"/>
+            <a:endParaRPr b="0" lang="en-US" sz="4400" spc="-1" strike="noStrike">
+              <a:solidFill>
+                <a:srgbClr val="000000"/>
+              </a:solidFill>
+              <a:uFill>
+                <a:solidFill>
+                  <a:srgbClr val="ffffff"/>
+                </a:solidFill>
+              </a:uFill>
+              <a:latin typeface="Arial"/>
+            </a:endParaRPr>
+          </a:p>
+        </p:txBody>
+      </p:sp>
+      <p:sp>
+        <p:nvSpPr>
+          <p:cNvPr id="99" name="PlaceHolder 2"/>
+          <p:cNvSpPr>
+            <a:spLocks noGrp="1"/>
+          </p:cNvSpPr>
+          <p:nvPr>
+            <p:ph type="body"/>
+          </p:nvPr>
+        </p:nvSpPr>
+        <p:spPr>
+          <a:xfrm>
+            <a:off x="504000" y="1768680"/>
+            <a:ext cx="4426920" cy="2090880"/>
+          </a:xfrm>
+          <a:prstGeom prst="rect">
+            <a:avLst/>
+          </a:prstGeom>
+        </p:spPr>
+        <p:txBody>
+          <a:bodyPr lIns="0" rIns="0" tIns="0" bIns="0"/>
+          <a:p>
+            <a:endParaRPr b="0" lang="en-US" sz="3200" spc="-1" strike="noStrike">
+              <a:solidFill>
+                <a:srgbClr val="000000"/>
+              </a:solidFill>
+              <a:uFill>
+                <a:solidFill>
+                  <a:srgbClr val="ffffff"/>
+                </a:solidFill>
+              </a:uFill>
+              <a:latin typeface="Arial"/>
+            </a:endParaRPr>
+          </a:p>
+        </p:txBody>
+      </p:sp>
+      <p:sp>
+        <p:nvSpPr>
+          <p:cNvPr id="100" name="PlaceHolder 3"/>
+          <p:cNvSpPr>
+            <a:spLocks noGrp="1"/>
+          </p:cNvSpPr>
+          <p:nvPr>
+            <p:ph type="body"/>
+          </p:nvPr>
+        </p:nvSpPr>
+        <p:spPr>
+          <a:xfrm>
+            <a:off x="5152680" y="1768680"/>
+            <a:ext cx="4426920" cy="2090880"/>
+          </a:xfrm>
+          <a:prstGeom prst="rect">
+            <a:avLst/>
+          </a:prstGeom>
+        </p:spPr>
+        <p:txBody>
+          <a:bodyPr lIns="0" rIns="0" tIns="0" bIns="0"/>
+          <a:p>
+            <a:endParaRPr b="0" lang="en-US" sz="3200" spc="-1" strike="noStrike">
+              <a:solidFill>
+                <a:srgbClr val="000000"/>
+              </a:solidFill>
+              <a:uFill>
+                <a:solidFill>
+                  <a:srgbClr val="ffffff"/>
+                </a:solidFill>
+              </a:uFill>
+              <a:latin typeface="Arial"/>
+            </a:endParaRPr>
+          </a:p>
+        </p:txBody>
+      </p:sp>
+      <p:sp>
+        <p:nvSpPr>
+          <p:cNvPr id="101" name="PlaceHolder 4"/>
+          <p:cNvSpPr>
+            <a:spLocks noGrp="1"/>
+          </p:cNvSpPr>
+          <p:nvPr>
+            <p:ph type="body"/>
+          </p:nvPr>
+        </p:nvSpPr>
+        <p:spPr>
+          <a:xfrm>
+            <a:off x="5152680" y="4058640"/>
+            <a:ext cx="4426920" cy="2090880"/>
+          </a:xfrm>
+          <a:prstGeom prst="rect">
+            <a:avLst/>
+          </a:prstGeom>
+        </p:spPr>
+        <p:txBody>
+          <a:bodyPr lIns="0" rIns="0" tIns="0" bIns="0"/>
+          <a:p>
+            <a:endParaRPr b="0" lang="en-US" sz="3200" spc="-1" strike="noStrike">
+              <a:solidFill>
+                <a:srgbClr val="000000"/>
+              </a:solidFill>
+              <a:uFill>
+                <a:solidFill>
+                  <a:srgbClr val="ffffff"/>
+                </a:solidFill>
+              </a:uFill>
+              <a:latin typeface="Arial"/>
+            </a:endParaRPr>
+          </a:p>
+        </p:txBody>
+      </p:sp>
+      <p:sp>
+        <p:nvSpPr>
+          <p:cNvPr id="102" name="PlaceHolder 5"/>
+          <p:cNvSpPr>
+            <a:spLocks noGrp="1"/>
+          </p:cNvSpPr>
+          <p:nvPr>
+            <p:ph type="body"/>
+          </p:nvPr>
+        </p:nvSpPr>
+        <p:spPr>
+          <a:xfrm>
+            <a:off x="504000" y="4058640"/>
+            <a:ext cx="4426920" cy="2090880"/>
+          </a:xfrm>
+          <a:prstGeom prst="rect">
+            <a:avLst/>
+          </a:prstGeom>
+        </p:spPr>
+        <p:txBody>
+          <a:bodyPr lIns="0" rIns="0" tIns="0" bIns="0"/>
+          <a:p>
+            <a:endParaRPr b="0" lang="en-US" sz="3200" spc="-1" strike="noStrike">
+              <a:solidFill>
+                <a:srgbClr val="000000"/>
+              </a:solidFill>
+              <a:uFill>
+                <a:solidFill>
+                  <a:srgbClr val="ffffff"/>
+                </a:solidFill>
+              </a:uFill>
+              <a:latin typeface="Arial"/>
+            </a:endParaRPr>
+          </a:p>
+        </p:txBody>
+      </p:sp>
+    </p:spTree>
+  </p:cSld>
+</p:sldLayout>
+</file>
+
+<file path=ppt/slideLayouts/slideLayout36.xml><?xml version="1.0" encoding="utf-8"?>
+<p:sldLayout xmlns:a="http://schemas.openxmlformats.org/drawingml/2006/main" xmlns:p="http://schemas.openxmlformats.org/presentationml/2006/main" xmlns:r="http://schemas.openxmlformats.org/officeDocument/2006/relationships" xmlns:p14="http://schemas.microsoft.com/office/powerpoint/2010/main" xmlns:p15="http://schemas.microsoft.com/office/powerpoint/2012/main" xmlns:mc="http://schemas.openxmlformats.org/markup-compatibility/2006" type="blank" preserve="1">
+  <p:cSld name="Title, 6 Content">
+    <p:spTree>
+      <p:nvGrpSpPr>
+        <p:cNvPr id="1" name=""/>
+        <p:cNvGrpSpPr/>
+        <p:nvPr/>
+      </p:nvGrpSpPr>
+      <p:grpSpPr>
+        <a:xfrm>
+          <a:off x="0" y="0"/>
+          <a:ext cx="0" cy="0"/>
+          <a:chOff x="0" y="0"/>
+          <a:chExt cx="0" cy="0"/>
+        </a:xfrm>
+      </p:grpSpPr>
+      <p:sp>
+        <p:nvSpPr>
+          <p:cNvPr id="103" name="PlaceHolder 1"/>
+          <p:cNvSpPr>
+            <a:spLocks noGrp="1"/>
+          </p:cNvSpPr>
+          <p:nvPr>
+            <p:ph type="title"/>
+          </p:nvPr>
+        </p:nvSpPr>
+        <p:spPr>
+          <a:xfrm>
+            <a:off x="504000" y="301320"/>
+            <a:ext cx="9072000" cy="1261800"/>
+          </a:xfrm>
+          <a:prstGeom prst="rect">
+            <a:avLst/>
+          </a:prstGeom>
+        </p:spPr>
+        <p:txBody>
+          <a:bodyPr lIns="0" rIns="0" tIns="0" bIns="0" anchor="ctr"/>
+          <a:p>
+            <a:pPr algn="ctr"/>
+            <a:endParaRPr b="0" lang="en-US" sz="4400" spc="-1" strike="noStrike">
+              <a:solidFill>
+                <a:srgbClr val="000000"/>
+              </a:solidFill>
+              <a:uFill>
+                <a:solidFill>
+                  <a:srgbClr val="ffffff"/>
+                </a:solidFill>
+              </a:uFill>
+              <a:latin typeface="Arial"/>
+            </a:endParaRPr>
+          </a:p>
+        </p:txBody>
+      </p:sp>
+      <p:sp>
+        <p:nvSpPr>
+          <p:cNvPr id="104" name="PlaceHolder 2"/>
+          <p:cNvSpPr>
+            <a:spLocks noGrp="1"/>
+          </p:cNvSpPr>
+          <p:nvPr>
+            <p:ph type="body"/>
+          </p:nvPr>
+        </p:nvSpPr>
+        <p:spPr>
+          <a:xfrm>
+            <a:off x="504000" y="1768680"/>
+            <a:ext cx="9072000" cy="4384080"/>
+          </a:xfrm>
+          <a:prstGeom prst="rect">
+            <a:avLst/>
+          </a:prstGeom>
+        </p:spPr>
+        <p:txBody>
+          <a:bodyPr lIns="0" rIns="0" tIns="0" bIns="0"/>
+          <a:p>
+            <a:endParaRPr b="0" lang="en-US" sz="3200" spc="-1" strike="noStrike">
+              <a:solidFill>
+                <a:srgbClr val="000000"/>
+              </a:solidFill>
+              <a:uFill>
+                <a:solidFill>
+                  <a:srgbClr val="ffffff"/>
+                </a:solidFill>
+              </a:uFill>
+              <a:latin typeface="Arial"/>
+            </a:endParaRPr>
+          </a:p>
+        </p:txBody>
+      </p:sp>
+      <p:sp>
+        <p:nvSpPr>
+          <p:cNvPr id="105" name="PlaceHolder 3"/>
+          <p:cNvSpPr>
+            <a:spLocks noGrp="1"/>
+          </p:cNvSpPr>
+          <p:nvPr>
+            <p:ph type="body"/>
+          </p:nvPr>
+        </p:nvSpPr>
+        <p:spPr>
+          <a:xfrm>
+            <a:off x="504000" y="1768680"/>
+            <a:ext cx="9072000" cy="4384080"/>
+          </a:xfrm>
+          <a:prstGeom prst="rect">
+            <a:avLst/>
+          </a:prstGeom>
+        </p:spPr>
+        <p:txBody>
+          <a:bodyPr lIns="0" rIns="0" tIns="0" bIns="0"/>
+          <a:p>
+            <a:endParaRPr b="0" lang="en-US" sz="3200" spc="-1" strike="noStrike">
+              <a:solidFill>
+                <a:srgbClr val="000000"/>
+              </a:solidFill>
+              <a:uFill>
+                <a:solidFill>
+                  <a:srgbClr val="ffffff"/>
+                </a:solidFill>
+              </a:uFill>
+              <a:latin typeface="Arial"/>
+            </a:endParaRPr>
+          </a:p>
+        </p:txBody>
+      </p:sp>
+      <p:pic>
+        <p:nvPicPr>
+          <p:cNvPr id="106" name="" descr=""/>
+          <p:cNvPicPr/>
+          <p:nvPr/>
+        </p:nvPicPr>
+        <p:blipFill>
+          <a:blip r:embed="rId2"/>
+          <a:stretch/>
+        </p:blipFill>
+        <p:spPr>
+          <a:xfrm>
+            <a:off x="2292480" y="1768680"/>
+            <a:ext cx="5494680" cy="4384080"/>
+          </a:xfrm>
+          <a:prstGeom prst="rect">
+            <a:avLst/>
+          </a:prstGeom>
+          <a:ln>
+            <a:noFill/>
+          </a:ln>
+        </p:spPr>
+      </p:pic>
+      <p:pic>
+        <p:nvPicPr>
+          <p:cNvPr id="107" name="" descr=""/>
+          <p:cNvPicPr/>
+          <p:nvPr/>
+        </p:nvPicPr>
+        <p:blipFill>
+          <a:blip r:embed="rId3"/>
+          <a:stretch/>
+        </p:blipFill>
+        <p:spPr>
+          <a:xfrm>
+            <a:off x="2292480" y="1768680"/>
+            <a:ext cx="5494680" cy="4384080"/>
+          </a:xfrm>
+          <a:prstGeom prst="rect">
+            <a:avLst/>
+          </a:prstGeom>
+          <a:ln>
+            <a:noFill/>
+          </a:ln>
+        </p:spPr>
+      </p:pic>
     </p:spTree>
   </p:cSld>
 </p:sldLayout>
@@ -3003,7 +4478,7 @@
         <p:spPr>
           <a:xfrm>
             <a:off x="504000" y="301320"/>
-            <a:ext cx="9072000" cy="1261800"/>
+            <a:ext cx="9071640" cy="1261440"/>
           </a:xfrm>
           <a:prstGeom prst="rect">
             <a:avLst/>
@@ -3013,20 +4488,6 @@
           <a:bodyPr lIns="0" rIns="0" tIns="0" bIns="0" anchor="ctr"/>
           <a:p>
             <a:pPr algn="ctr"/>
-            <a:r>
-              <a:rPr b="0" lang="en-US" sz="4400" spc="-1" strike="noStrike">
-                <a:solidFill>
-                  <a:srgbClr val="000000"/>
-                </a:solidFill>
-                <a:uFill>
-                  <a:solidFill>
-                    <a:srgbClr val="ffffff"/>
-                  </a:solidFill>
-                </a:uFill>
-                <a:latin typeface="Arial"/>
-              </a:rPr>
-              <a:t>Click to edit the title text format</a:t>
-            </a:r>
             <a:endParaRPr b="0" lang="en-US" sz="4400" spc="-1" strike="noStrike">
               <a:solidFill>
                 <a:srgbClr val="000000"/>
@@ -3054,7 +4515,7 @@
         <p:spPr>
           <a:xfrm>
             <a:off x="504000" y="1768680"/>
-            <a:ext cx="9072000" cy="4384080"/>
+            <a:ext cx="9071640" cy="4383720"/>
           </a:xfrm>
           <a:prstGeom prst="rect">
             <a:avLst/>
@@ -3072,7 +4533,7 @@
               <a:buChar char=""/>
             </a:pPr>
             <a:r>
-              <a:rPr b="0" lang="en-US" sz="3200" spc="-1" strike="noStrike">
+              <a:rPr b="0" lang="en-US" sz="1800" spc="-1" strike="noStrike">
                 <a:solidFill>
                   <a:srgbClr val="000000"/>
                 </a:solidFill>
@@ -3085,7 +4546,7 @@
               </a:rPr>
               <a:t>Click to edit the outline text format</a:t>
             </a:r>
-            <a:endParaRPr b="0" lang="en-US" sz="3200" spc="-1" strike="noStrike">
+            <a:endParaRPr b="0" lang="en-US" sz="1800" spc="-1" strike="noStrike">
               <a:solidFill>
                 <a:srgbClr val="000000"/>
               </a:solidFill>
@@ -3107,7 +4568,7 @@
               <a:buChar char=""/>
             </a:pPr>
             <a:r>
-              <a:rPr b="0" lang="en-US" sz="2800" spc="-1" strike="noStrike">
+              <a:rPr b="0" lang="en-US" sz="1800" spc="-1" strike="noStrike">
                 <a:solidFill>
                   <a:srgbClr val="000000"/>
                 </a:solidFill>
@@ -3120,7 +4581,7 @@
               </a:rPr>
               <a:t>Second Outline Level</a:t>
             </a:r>
-            <a:endParaRPr b="0" lang="en-US" sz="2800" spc="-1" strike="noStrike">
+            <a:endParaRPr b="0" lang="en-US" sz="1800" spc="-1" strike="noStrike">
               <a:solidFill>
                 <a:srgbClr val="000000"/>
               </a:solidFill>
@@ -3142,7 +4603,7 @@
               <a:buChar char=""/>
             </a:pPr>
             <a:r>
-              <a:rPr b="0" lang="en-US" sz="2400" spc="-1" strike="noStrike">
+              <a:rPr b="0" lang="en-US" sz="1800" spc="-1" strike="noStrike">
                 <a:solidFill>
                   <a:srgbClr val="000000"/>
                 </a:solidFill>
@@ -3155,7 +4616,7 @@
               </a:rPr>
               <a:t>Third Outline Level</a:t>
             </a:r>
-            <a:endParaRPr b="0" lang="en-US" sz="2400" spc="-1" strike="noStrike">
+            <a:endParaRPr b="0" lang="en-US" sz="1800" spc="-1" strike="noStrike">
               <a:solidFill>
                 <a:srgbClr val="000000"/>
               </a:solidFill>
@@ -3177,7 +4638,7 @@
               <a:buChar char=""/>
             </a:pPr>
             <a:r>
-              <a:rPr b="0" lang="en-US" sz="2000" spc="-1" strike="noStrike">
+              <a:rPr b="0" lang="en-US" sz="1800" spc="-1" strike="noStrike">
                 <a:solidFill>
                   <a:srgbClr val="000000"/>
                 </a:solidFill>
@@ -3190,7 +4651,7 @@
               </a:rPr>
               <a:t>Fourth Outline Level</a:t>
             </a:r>
-            <a:endParaRPr b="0" lang="en-US" sz="2000" spc="-1" strike="noStrike">
+            <a:endParaRPr b="0" lang="en-US" sz="1800" spc="-1" strike="noStrike">
               <a:solidFill>
                 <a:srgbClr val="000000"/>
               </a:solidFill>
@@ -3212,7 +4673,7 @@
               <a:buChar char=""/>
             </a:pPr>
             <a:r>
-              <a:rPr b="0" lang="en-US" sz="2000" spc="-1" strike="noStrike">
+              <a:rPr b="0" lang="en-US" sz="1800" spc="-1" strike="noStrike">
                 <a:solidFill>
                   <a:srgbClr val="000000"/>
                 </a:solidFill>
@@ -3225,7 +4686,7 @@
               </a:rPr>
               <a:t>Fifth Outline Level</a:t>
             </a:r>
-            <a:endParaRPr b="0" lang="en-US" sz="2000" spc="-1" strike="noStrike">
+            <a:endParaRPr b="0" lang="en-US" sz="1800" spc="-1" strike="noStrike">
               <a:solidFill>
                 <a:srgbClr val="000000"/>
               </a:solidFill>
@@ -3247,7 +4708,7 @@
               <a:buChar char=""/>
             </a:pPr>
             <a:r>
-              <a:rPr b="0" lang="en-US" sz="2000" spc="-1" strike="noStrike">
+              <a:rPr b="0" lang="en-US" sz="1800" spc="-1" strike="noStrike">
                 <a:solidFill>
                   <a:srgbClr val="000000"/>
                 </a:solidFill>
@@ -3260,7 +4721,7 @@
               </a:rPr>
               <a:t>Sixth Outline Level</a:t>
             </a:r>
-            <a:endParaRPr b="0" lang="en-US" sz="2000" spc="-1" strike="noStrike">
+            <a:endParaRPr b="0" lang="en-US" sz="1800" spc="-1" strike="noStrike">
               <a:solidFill>
                 <a:srgbClr val="000000"/>
               </a:solidFill>
@@ -3282,7 +4743,7 @@
               <a:buChar char=""/>
             </a:pPr>
             <a:r>
-              <a:rPr b="0" lang="en-US" sz="2000" spc="-1" strike="noStrike">
+              <a:rPr b="0" lang="en-US" sz="1800" spc="-1" strike="noStrike">
                 <a:solidFill>
                   <a:srgbClr val="000000"/>
                 </a:solidFill>
@@ -3295,7 +4756,7 @@
               </a:rPr>
               <a:t>Seventh Outline Level</a:t>
             </a:r>
-            <a:endParaRPr b="0" lang="en-US" sz="2000" spc="-1" strike="noStrike">
+            <a:endParaRPr b="0" lang="en-US" sz="1800" spc="-1" strike="noStrike">
               <a:solidFill>
                 <a:srgbClr val="000000"/>
               </a:solidFill>
@@ -3685,6 +5146,362 @@
 </p:sldMaster>
 </file>
 
+<file path=ppt/slideMasters/slideMaster3.xml><?xml version="1.0" encoding="utf-8"?>
+<p:sldMaster xmlns:a="http://schemas.openxmlformats.org/drawingml/2006/main" xmlns:p="http://schemas.openxmlformats.org/presentationml/2006/main" xmlns:r="http://schemas.openxmlformats.org/officeDocument/2006/relationships" xmlns:p14="http://schemas.microsoft.com/office/powerpoint/2010/main" xmlns:p15="http://schemas.microsoft.com/office/powerpoint/2012/main" xmlns:mc="http://schemas.openxmlformats.org/markup-compatibility/2006">
+  <p:cSld>
+    <p:spTree>
+      <p:nvGrpSpPr>
+        <p:cNvPr id="1" name=""/>
+        <p:cNvGrpSpPr/>
+        <p:nvPr/>
+      </p:nvGrpSpPr>
+      <p:grpSpPr>
+        <a:xfrm>
+          <a:off x="0" y="0"/>
+          <a:ext cx="0" cy="0"/>
+          <a:chOff x="0" y="0"/>
+          <a:chExt cx="0" cy="0"/>
+        </a:xfrm>
+      </p:grpSpPr>
+      <p:sp>
+        <p:nvSpPr>
+          <p:cNvPr id="72" name="PlaceHolder 1"/>
+          <p:cNvSpPr>
+            <a:spLocks noGrp="1"/>
+          </p:cNvSpPr>
+          <p:nvPr>
+            <p:ph type="title"/>
+          </p:nvPr>
+        </p:nvSpPr>
+        <p:spPr>
+          <a:xfrm>
+            <a:off x="504000" y="301320"/>
+            <a:ext cx="9072000" cy="1261800"/>
+          </a:xfrm>
+          <a:prstGeom prst="rect">
+            <a:avLst/>
+          </a:prstGeom>
+        </p:spPr>
+        <p:txBody>
+          <a:bodyPr lIns="0" rIns="0" tIns="0" bIns="0" anchor="ctr"/>
+          <a:p>
+            <a:pPr algn="ctr"/>
+            <a:r>
+              <a:rPr b="0" lang="en-US" sz="4400" spc="-1" strike="noStrike">
+                <a:solidFill>
+                  <a:srgbClr val="000000"/>
+                </a:solidFill>
+                <a:uFill>
+                  <a:solidFill>
+                    <a:srgbClr val="ffffff"/>
+                  </a:solidFill>
+                </a:uFill>
+                <a:latin typeface="Arial"/>
+              </a:rPr>
+              <a:t>Click to edit the title text format</a:t>
+            </a:r>
+            <a:endParaRPr b="0" lang="en-US" sz="4400" spc="-1" strike="noStrike">
+              <a:solidFill>
+                <a:srgbClr val="000000"/>
+              </a:solidFill>
+              <a:uFill>
+                <a:solidFill>
+                  <a:srgbClr val="ffffff"/>
+                </a:solidFill>
+              </a:uFill>
+              <a:latin typeface="Arial"/>
+            </a:endParaRPr>
+          </a:p>
+        </p:txBody>
+      </p:sp>
+      <p:sp>
+        <p:nvSpPr>
+          <p:cNvPr id="73" name="PlaceHolder 2"/>
+          <p:cNvSpPr>
+            <a:spLocks noGrp="1"/>
+          </p:cNvSpPr>
+          <p:nvPr>
+            <p:ph type="body"/>
+          </p:nvPr>
+        </p:nvSpPr>
+        <p:spPr>
+          <a:xfrm>
+            <a:off x="504000" y="1768680"/>
+            <a:ext cx="9072000" cy="4384080"/>
+          </a:xfrm>
+          <a:prstGeom prst="rect">
+            <a:avLst/>
+          </a:prstGeom>
+        </p:spPr>
+        <p:txBody>
+          <a:bodyPr lIns="0" rIns="0" tIns="0" bIns="0"/>
+          <a:p>
+            <a:pPr marL="432000" indent="-324000">
+              <a:buClr>
+                <a:srgbClr val="000000"/>
+              </a:buClr>
+              <a:buSzPct val="45000"/>
+              <a:buFont typeface="Wingdings" charset="2"/>
+              <a:buChar char=""/>
+            </a:pPr>
+            <a:r>
+              <a:rPr b="0" lang="en-US" sz="3200" spc="-1" strike="noStrike">
+                <a:solidFill>
+                  <a:srgbClr val="000000"/>
+                </a:solidFill>
+                <a:uFill>
+                  <a:solidFill>
+                    <a:srgbClr val="ffffff"/>
+                  </a:solidFill>
+                </a:uFill>
+                <a:latin typeface="Arial"/>
+              </a:rPr>
+              <a:t>Click to edit the outline text format</a:t>
+            </a:r>
+            <a:endParaRPr b="0" lang="en-US" sz="3200" spc="-1" strike="noStrike">
+              <a:solidFill>
+                <a:srgbClr val="000000"/>
+              </a:solidFill>
+              <a:uFill>
+                <a:solidFill>
+                  <a:srgbClr val="ffffff"/>
+                </a:solidFill>
+              </a:uFill>
+              <a:latin typeface="Arial"/>
+            </a:endParaRPr>
+          </a:p>
+          <a:p>
+            <a:pPr lvl="1" marL="864000" indent="-324000">
+              <a:buClr>
+                <a:srgbClr val="000000"/>
+              </a:buClr>
+              <a:buSzPct val="75000"/>
+              <a:buFont typeface="Symbol" charset="2"/>
+              <a:buChar char=""/>
+            </a:pPr>
+            <a:r>
+              <a:rPr b="0" lang="en-US" sz="2800" spc="-1" strike="noStrike">
+                <a:solidFill>
+                  <a:srgbClr val="000000"/>
+                </a:solidFill>
+                <a:uFill>
+                  <a:solidFill>
+                    <a:srgbClr val="ffffff"/>
+                  </a:solidFill>
+                </a:uFill>
+                <a:latin typeface="Arial"/>
+              </a:rPr>
+              <a:t>Second Outline Level</a:t>
+            </a:r>
+            <a:endParaRPr b="0" lang="en-US" sz="2800" spc="-1" strike="noStrike">
+              <a:solidFill>
+                <a:srgbClr val="000000"/>
+              </a:solidFill>
+              <a:uFill>
+                <a:solidFill>
+                  <a:srgbClr val="ffffff"/>
+                </a:solidFill>
+              </a:uFill>
+              <a:latin typeface="Arial"/>
+            </a:endParaRPr>
+          </a:p>
+          <a:p>
+            <a:pPr lvl="2" marL="1296000" indent="-288000">
+              <a:buClr>
+                <a:srgbClr val="000000"/>
+              </a:buClr>
+              <a:buSzPct val="45000"/>
+              <a:buFont typeface="Wingdings" charset="2"/>
+              <a:buChar char=""/>
+            </a:pPr>
+            <a:r>
+              <a:rPr b="0" lang="en-US" sz="2400" spc="-1" strike="noStrike">
+                <a:solidFill>
+                  <a:srgbClr val="000000"/>
+                </a:solidFill>
+                <a:uFill>
+                  <a:solidFill>
+                    <a:srgbClr val="ffffff"/>
+                  </a:solidFill>
+                </a:uFill>
+                <a:latin typeface="Arial"/>
+              </a:rPr>
+              <a:t>Third Outline Level</a:t>
+            </a:r>
+            <a:endParaRPr b="0" lang="en-US" sz="2400" spc="-1" strike="noStrike">
+              <a:solidFill>
+                <a:srgbClr val="000000"/>
+              </a:solidFill>
+              <a:uFill>
+                <a:solidFill>
+                  <a:srgbClr val="ffffff"/>
+                </a:solidFill>
+              </a:uFill>
+              <a:latin typeface="Arial"/>
+            </a:endParaRPr>
+          </a:p>
+          <a:p>
+            <a:pPr lvl="3" marL="1728000" indent="-216000">
+              <a:buClr>
+                <a:srgbClr val="000000"/>
+              </a:buClr>
+              <a:buSzPct val="75000"/>
+              <a:buFont typeface="Symbol" charset="2"/>
+              <a:buChar char=""/>
+            </a:pPr>
+            <a:r>
+              <a:rPr b="0" lang="en-US" sz="2000" spc="-1" strike="noStrike">
+                <a:solidFill>
+                  <a:srgbClr val="000000"/>
+                </a:solidFill>
+                <a:uFill>
+                  <a:solidFill>
+                    <a:srgbClr val="ffffff"/>
+                  </a:solidFill>
+                </a:uFill>
+                <a:latin typeface="Arial"/>
+              </a:rPr>
+              <a:t>Fourth Outline Level</a:t>
+            </a:r>
+            <a:endParaRPr b="0" lang="en-US" sz="2000" spc="-1" strike="noStrike">
+              <a:solidFill>
+                <a:srgbClr val="000000"/>
+              </a:solidFill>
+              <a:uFill>
+                <a:solidFill>
+                  <a:srgbClr val="ffffff"/>
+                </a:solidFill>
+              </a:uFill>
+              <a:latin typeface="Arial"/>
+            </a:endParaRPr>
+          </a:p>
+          <a:p>
+            <a:pPr lvl="4" marL="2160000" indent="-216000">
+              <a:buClr>
+                <a:srgbClr val="000000"/>
+              </a:buClr>
+              <a:buSzPct val="45000"/>
+              <a:buFont typeface="Wingdings" charset="2"/>
+              <a:buChar char=""/>
+            </a:pPr>
+            <a:r>
+              <a:rPr b="0" lang="en-US" sz="2000" spc="-1" strike="noStrike">
+                <a:solidFill>
+                  <a:srgbClr val="000000"/>
+                </a:solidFill>
+                <a:uFill>
+                  <a:solidFill>
+                    <a:srgbClr val="ffffff"/>
+                  </a:solidFill>
+                </a:uFill>
+                <a:latin typeface="Arial"/>
+              </a:rPr>
+              <a:t>Fifth Outline Level</a:t>
+            </a:r>
+            <a:endParaRPr b="0" lang="en-US" sz="2000" spc="-1" strike="noStrike">
+              <a:solidFill>
+                <a:srgbClr val="000000"/>
+              </a:solidFill>
+              <a:uFill>
+                <a:solidFill>
+                  <a:srgbClr val="ffffff"/>
+                </a:solidFill>
+              </a:uFill>
+              <a:latin typeface="Arial"/>
+            </a:endParaRPr>
+          </a:p>
+          <a:p>
+            <a:pPr lvl="5" marL="2592000" indent="-216000">
+              <a:buClr>
+                <a:srgbClr val="000000"/>
+              </a:buClr>
+              <a:buSzPct val="45000"/>
+              <a:buFont typeface="Wingdings" charset="2"/>
+              <a:buChar char=""/>
+            </a:pPr>
+            <a:r>
+              <a:rPr b="0" lang="en-US" sz="2000" spc="-1" strike="noStrike">
+                <a:solidFill>
+                  <a:srgbClr val="000000"/>
+                </a:solidFill>
+                <a:uFill>
+                  <a:solidFill>
+                    <a:srgbClr val="ffffff"/>
+                  </a:solidFill>
+                </a:uFill>
+                <a:latin typeface="Arial"/>
+              </a:rPr>
+              <a:t>Sixth Outline Level</a:t>
+            </a:r>
+            <a:endParaRPr b="0" lang="en-US" sz="2000" spc="-1" strike="noStrike">
+              <a:solidFill>
+                <a:srgbClr val="000000"/>
+              </a:solidFill>
+              <a:uFill>
+                <a:solidFill>
+                  <a:srgbClr val="ffffff"/>
+                </a:solidFill>
+              </a:uFill>
+              <a:latin typeface="Arial"/>
+            </a:endParaRPr>
+          </a:p>
+          <a:p>
+            <a:pPr lvl="6" marL="3024000" indent="-216000">
+              <a:buClr>
+                <a:srgbClr val="000000"/>
+              </a:buClr>
+              <a:buSzPct val="45000"/>
+              <a:buFont typeface="Wingdings" charset="2"/>
+              <a:buChar char=""/>
+            </a:pPr>
+            <a:r>
+              <a:rPr b="0" lang="en-US" sz="2000" spc="-1" strike="noStrike">
+                <a:solidFill>
+                  <a:srgbClr val="000000"/>
+                </a:solidFill>
+                <a:uFill>
+                  <a:solidFill>
+                    <a:srgbClr val="ffffff"/>
+                  </a:solidFill>
+                </a:uFill>
+                <a:latin typeface="Arial"/>
+              </a:rPr>
+              <a:t>Seventh Outline Level</a:t>
+            </a:r>
+            <a:endParaRPr b="0" lang="en-US" sz="2000" spc="-1" strike="noStrike">
+              <a:solidFill>
+                <a:srgbClr val="000000"/>
+              </a:solidFill>
+              <a:uFill>
+                <a:solidFill>
+                  <a:srgbClr val="ffffff"/>
+                </a:solidFill>
+              </a:uFill>
+              <a:latin typeface="Arial"/>
+            </a:endParaRPr>
+          </a:p>
+        </p:txBody>
+      </p:sp>
+    </p:spTree>
+  </p:cSld>
+  <p:clrMap bg1="lt1" bg2="lt2" tx1="dk1" tx2="dk2" accent1="accent1" accent2="accent2" accent3="accent3" accent4="accent4" accent5="accent5" accent6="accent6" hlink="hlink" folHlink="folHlink"/>
+  <p:sldLayoutIdLst>
+    <p:sldLayoutId id="2147483675" r:id="rId2"/>
+    <p:sldLayoutId id="2147483676" r:id="rId3"/>
+    <p:sldLayoutId id="2147483677" r:id="rId4"/>
+    <p:sldLayoutId id="2147483678" r:id="rId5"/>
+    <p:sldLayoutId id="2147483679" r:id="rId6"/>
+    <p:sldLayoutId id="2147483680" r:id="rId7"/>
+    <p:sldLayoutId id="2147483681" r:id="rId8"/>
+    <p:sldLayoutId id="2147483682" r:id="rId9"/>
+    <p:sldLayoutId id="2147483683" r:id="rId10"/>
+    <p:sldLayoutId id="2147483684" r:id="rId11"/>
+    <p:sldLayoutId id="2147483685" r:id="rId12"/>
+    <p:sldLayoutId id="2147483686" r:id="rId13"/>
+  </p:sldLayoutIdLst>
+</p:sldMaster>
+</file>
+
 <file path=ppt/slides/slide1.xml><?xml version="1.0" encoding="utf-8"?>
 <p:sld xmlns:a="http://schemas.openxmlformats.org/drawingml/2006/main" xmlns:p="http://schemas.openxmlformats.org/presentationml/2006/main" xmlns:r="http://schemas.openxmlformats.org/officeDocument/2006/relationships" xmlns:p14="http://schemas.microsoft.com/office/powerpoint/2010/main" xmlns:p15="http://schemas.microsoft.com/office/powerpoint/2012/main" xmlns:mc="http://schemas.openxmlformats.org/markup-compatibility/2006">
   <p:cSld>
@@ -3704,14 +5521,14 @@
       </p:grpSpPr>
       <p:sp>
         <p:nvSpPr>
-          <p:cNvPr id="72" name="CustomShape 1"/>
+          <p:cNvPr id="108" name="CustomShape 1"/>
           <p:cNvSpPr/>
           <p:nvPr/>
         </p:nvSpPr>
         <p:spPr>
           <a:xfrm>
             <a:off x="0" y="4256280"/>
-            <a:ext cx="10078920" cy="1974960"/>
+            <a:ext cx="10078200" cy="1974240"/>
           </a:xfrm>
           <a:prstGeom prst="rect">
             <a:avLst/>
@@ -3799,7 +5616,7 @@
                 <a:latin typeface="Verdana"/>
                 <a:ea typeface="DejaVu Sans"/>
               </a:rPr>
-              <a:t>For AUTHORS, ACTORS, &amp; FILMMAKERS</a:t>
+              <a:t>For INDIE ACTORS</a:t>
             </a:r>
             <a:endParaRPr b="0" lang="en-US" sz="1800" spc="-1" strike="noStrike">
               <a:solidFill>
@@ -3817,7 +5634,7 @@
       </p:sp>
       <p:pic>
         <p:nvPicPr>
-          <p:cNvPr id="73" name="" descr=""/>
+          <p:cNvPr id="109" name="" descr=""/>
           <p:cNvPicPr/>
           <p:nvPr/>
         </p:nvPicPr>
@@ -3828,7 +5645,7 @@
         <p:spPr>
           <a:xfrm>
             <a:off x="3770280" y="822960"/>
-            <a:ext cx="2538000" cy="2538000"/>
+            <a:ext cx="2537280" cy="2537280"/>
           </a:xfrm>
           <a:prstGeom prst="rect">
             <a:avLst/>
@@ -3889,14 +5706,14 @@
       </p:grpSpPr>
       <p:sp>
         <p:nvSpPr>
-          <p:cNvPr id="109" name="CustomShape 1"/>
+          <p:cNvPr id="144" name="CustomShape 1"/>
           <p:cNvSpPr/>
           <p:nvPr/>
         </p:nvSpPr>
         <p:spPr>
           <a:xfrm>
             <a:off x="457200" y="118440"/>
-            <a:ext cx="9600840" cy="887040"/>
+            <a:ext cx="9600120" cy="886320"/>
           </a:xfrm>
           <a:prstGeom prst="rect">
             <a:avLst/>
@@ -3946,7 +5763,7 @@
       </p:sp>
       <p:pic>
         <p:nvPicPr>
-          <p:cNvPr id="110" name="" descr=""/>
+          <p:cNvPr id="145" name="" descr=""/>
           <p:cNvPicPr/>
           <p:nvPr/>
         </p:nvPicPr>
@@ -3957,7 +5774,7 @@
         <p:spPr>
           <a:xfrm>
             <a:off x="6109920" y="108360"/>
-            <a:ext cx="1903320" cy="1903320"/>
+            <a:ext cx="1902600" cy="1902600"/>
           </a:xfrm>
           <a:prstGeom prst="rect">
             <a:avLst/>
@@ -3969,14 +5786,14 @@
       </p:pic>
       <p:sp>
         <p:nvSpPr>
-          <p:cNvPr id="111" name="CustomShape 2"/>
+          <p:cNvPr id="146" name="CustomShape 2"/>
           <p:cNvSpPr/>
           <p:nvPr/>
         </p:nvSpPr>
         <p:spPr>
           <a:xfrm>
             <a:off x="7299720" y="6419520"/>
-            <a:ext cx="2027160" cy="804240"/>
+            <a:ext cx="2026440" cy="803520"/>
           </a:xfrm>
           <a:prstGeom prst="rect">
             <a:avLst/>
@@ -4031,14 +5848,14 @@
       </p:sp>
       <p:sp>
         <p:nvSpPr>
-          <p:cNvPr id="112" name="CustomShape 3"/>
+          <p:cNvPr id="147" name="CustomShape 3"/>
           <p:cNvSpPr/>
           <p:nvPr/>
         </p:nvSpPr>
         <p:spPr>
           <a:xfrm>
             <a:off x="182880" y="1103040"/>
-            <a:ext cx="2742120" cy="725760"/>
+            <a:ext cx="2741400" cy="725040"/>
           </a:xfrm>
           <a:prstGeom prst="rect">
             <a:avLst/>
@@ -4061,14 +5878,14 @@
       </p:sp>
       <p:sp>
         <p:nvSpPr>
-          <p:cNvPr id="113" name="CustomShape 4"/>
+          <p:cNvPr id="148" name="CustomShape 4"/>
           <p:cNvSpPr/>
           <p:nvPr/>
         </p:nvSpPr>
         <p:spPr>
           <a:xfrm>
             <a:off x="346320" y="1194480"/>
-            <a:ext cx="2487240" cy="1481040"/>
+            <a:ext cx="2486520" cy="1480320"/>
           </a:xfrm>
           <a:prstGeom prst="rect">
             <a:avLst/>
@@ -4123,7 +5940,7 @@
       </p:sp>
       <p:pic>
         <p:nvPicPr>
-          <p:cNvPr id="114" name="" descr=""/>
+          <p:cNvPr id="149" name="" descr=""/>
           <p:cNvPicPr/>
           <p:nvPr/>
         </p:nvPicPr>
@@ -4134,7 +5951,7 @@
         <p:spPr>
           <a:xfrm>
             <a:off x="1280160" y="2493000"/>
-            <a:ext cx="5393880" cy="1804680"/>
+            <a:ext cx="5393160" cy="1803960"/>
           </a:xfrm>
           <a:prstGeom prst="rect">
             <a:avLst/>
@@ -4146,14 +5963,14 @@
       </p:pic>
       <p:sp>
         <p:nvSpPr>
-          <p:cNvPr id="115" name="CustomShape 5"/>
+          <p:cNvPr id="150" name="CustomShape 5"/>
           <p:cNvSpPr/>
           <p:nvPr/>
         </p:nvSpPr>
         <p:spPr>
           <a:xfrm>
             <a:off x="2103120" y="1920240"/>
-            <a:ext cx="3930840" cy="1187640"/>
+            <a:ext cx="3930120" cy="1186920"/>
           </a:xfrm>
           <a:prstGeom prst="rect">
             <a:avLst/>
@@ -4208,14 +6025,14 @@
       </p:sp>
       <p:sp>
         <p:nvSpPr>
-          <p:cNvPr id="116" name="CustomShape 6"/>
+          <p:cNvPr id="151" name="CustomShape 6"/>
           <p:cNvSpPr/>
           <p:nvPr/>
         </p:nvSpPr>
         <p:spPr>
           <a:xfrm>
             <a:off x="4282200" y="4773600"/>
-            <a:ext cx="3673080" cy="1078560"/>
+            <a:ext cx="3672360" cy="1077840"/>
           </a:xfrm>
           <a:prstGeom prst="rect">
             <a:avLst/>
@@ -4270,6 +6087,33 @@
       </p:sp>
     </p:spTree>
   </p:cSld>
+  <p:timing>
+    <p:tnLst>
+      <p:par>
+        <p:cTn id="19" dur="indefinite" restart="never" nodeType="tmRoot">
+          <p:childTnLst>
+            <p:seq>
+              <p:cTn id="20" nodeType="mainSeq"/>
+              <p:prevCondLst>
+                <p:cond delay="0" evt="onPrev">
+                  <p:tgtEl>
+                    <p:sldTgt/>
+                  </p:tgtEl>
+                </p:cond>
+              </p:prevCondLst>
+              <p:nextCondLst>
+                <p:cond delay="0" evt="onNext">
+                  <p:tgtEl>
+                    <p:sldTgt/>
+                  </p:tgtEl>
+                </p:cond>
+              </p:nextCondLst>
+            </p:seq>
+          </p:childTnLst>
+        </p:cTn>
+      </p:par>
+    </p:tnLst>
+  </p:timing>
 </p:sld>
 </file>
 
@@ -4292,14 +6136,14 @@
       </p:grpSpPr>
       <p:sp>
         <p:nvSpPr>
-          <p:cNvPr id="117" name="CustomShape 1"/>
+          <p:cNvPr id="152" name="CustomShape 1"/>
           <p:cNvSpPr/>
           <p:nvPr/>
         </p:nvSpPr>
         <p:spPr>
           <a:xfrm>
             <a:off x="504000" y="301320"/>
-            <a:ext cx="9070560" cy="1261080"/>
+            <a:ext cx="9069840" cy="1260360"/>
           </a:xfrm>
           <a:prstGeom prst="rect">
             <a:avLst/>
@@ -4349,14 +6193,14 @@
       </p:sp>
       <p:sp>
         <p:nvSpPr>
-          <p:cNvPr id="118" name="CustomShape 2"/>
+          <p:cNvPr id="153" name="CustomShape 2"/>
           <p:cNvSpPr/>
           <p:nvPr/>
         </p:nvSpPr>
         <p:spPr>
           <a:xfrm>
             <a:off x="163440" y="1769040"/>
-            <a:ext cx="9345240" cy="4444560"/>
+            <a:ext cx="9344520" cy="4443840"/>
           </a:xfrm>
           <a:prstGeom prst="rect">
             <a:avLst/>
@@ -4374,88 +6218,6 @@
         </p:style>
         <p:txBody>
           <a:bodyPr lIns="0" rIns="0" tIns="0" bIns="0"/>
-          <a:p>
-            <a:r>
-              <a:rPr b="0" lang="en-US" sz="3200" spc="-1" strike="noStrike">
-                <a:solidFill>
-                  <a:srgbClr val="3c2154"/>
-                </a:solidFill>
-                <a:uFill>
-                  <a:solidFill>
-                    <a:srgbClr val="ffffff"/>
-                  </a:solidFill>
-                </a:uFill>
-                <a:latin typeface="Verdana"/>
-                <a:ea typeface="DejaVu Sans"/>
-              </a:rPr>
-              <a:t>Some books do well on kickstarter, indiegogo</a:t>
-            </a:r>
-            <a:endParaRPr b="0" lang="en-US" sz="1800" spc="-1" strike="noStrike">
-              <a:solidFill>
-                <a:srgbClr val="000000"/>
-              </a:solidFill>
-              <a:uFill>
-                <a:solidFill>
-                  <a:srgbClr val="ffffff"/>
-                </a:solidFill>
-              </a:uFill>
-              <a:latin typeface="Arial"/>
-            </a:endParaRPr>
-          </a:p>
-          <a:p>
-            <a:endParaRPr b="0" lang="en-US" sz="1800" spc="-1" strike="noStrike">
-              <a:solidFill>
-                <a:srgbClr val="000000"/>
-              </a:solidFill>
-              <a:uFill>
-                <a:solidFill>
-                  <a:srgbClr val="ffffff"/>
-                </a:solidFill>
-              </a:uFill>
-              <a:latin typeface="Arial"/>
-            </a:endParaRPr>
-          </a:p>
-          <a:p>
-            <a:r>
-              <a:rPr b="0" lang="en-US" sz="3200" spc="-1" strike="noStrike">
-                <a:solidFill>
-                  <a:srgbClr val="3c2154"/>
-                </a:solidFill>
-                <a:uFill>
-                  <a:solidFill>
-                    <a:srgbClr val="ffffff"/>
-                  </a:solidFill>
-                </a:uFill>
-                <a:latin typeface="Verdana"/>
-                <a:ea typeface="DejaVu Sans"/>
-              </a:rPr>
-              <a:t>Self published books on Amazon</a:t>
-            </a:r>
-            <a:endParaRPr b="0" lang="en-US" sz="1800" spc="-1" strike="noStrike">
-              <a:solidFill>
-                <a:srgbClr val="000000"/>
-              </a:solidFill>
-              <a:uFill>
-                <a:solidFill>
-                  <a:srgbClr val="ffffff"/>
-                </a:solidFill>
-              </a:uFill>
-              <a:latin typeface="Arial"/>
-            </a:endParaRPr>
-          </a:p>
-          <a:p>
-            <a:endParaRPr b="0" lang="en-US" sz="1800" spc="-1" strike="noStrike">
-              <a:solidFill>
-                <a:srgbClr val="000000"/>
-              </a:solidFill>
-              <a:uFill>
-                <a:solidFill>
-                  <a:srgbClr val="ffffff"/>
-                </a:solidFill>
-              </a:uFill>
-              <a:latin typeface="Arial"/>
-            </a:endParaRPr>
-          </a:p>
           <a:p>
             <a:r>
               <a:rPr b="0" lang="en-US" sz="3200" spc="-1" strike="noStrike">
@@ -4542,7 +6304,7 @@
       </p:sp>
       <p:pic>
         <p:nvPicPr>
-          <p:cNvPr id="119" name="" descr=""/>
+          <p:cNvPr id="154" name="" descr=""/>
           <p:cNvPicPr/>
           <p:nvPr/>
         </p:nvPicPr>
@@ -4553,7 +6315,7 @@
         <p:spPr>
           <a:xfrm>
             <a:off x="7513920" y="4679280"/>
-            <a:ext cx="1903320" cy="1903320"/>
+            <a:ext cx="1902600" cy="1902600"/>
           </a:xfrm>
           <a:prstGeom prst="rect">
             <a:avLst/>
@@ -4565,6 +6327,33 @@
       </p:pic>
     </p:spTree>
   </p:cSld>
+  <p:timing>
+    <p:tnLst>
+      <p:par>
+        <p:cTn id="21" dur="indefinite" restart="never" nodeType="tmRoot">
+          <p:childTnLst>
+            <p:seq>
+              <p:cTn id="22" nodeType="mainSeq"/>
+              <p:prevCondLst>
+                <p:cond delay="0" evt="onPrev">
+                  <p:tgtEl>
+                    <p:sldTgt/>
+                  </p:tgtEl>
+                </p:cond>
+              </p:prevCondLst>
+              <p:nextCondLst>
+                <p:cond delay="0" evt="onNext">
+                  <p:tgtEl>
+                    <p:sldTgt/>
+                  </p:tgtEl>
+                </p:cond>
+              </p:nextCondLst>
+            </p:seq>
+          </p:childTnLst>
+        </p:cTn>
+      </p:par>
+    </p:tnLst>
+  </p:timing>
 </p:sld>
 </file>
 
@@ -4587,14 +6376,14 @@
       </p:grpSpPr>
       <p:sp>
         <p:nvSpPr>
-          <p:cNvPr id="120" name="CustomShape 1"/>
+          <p:cNvPr id="155" name="CustomShape 1"/>
           <p:cNvSpPr/>
           <p:nvPr/>
         </p:nvSpPr>
         <p:spPr>
           <a:xfrm>
             <a:off x="504000" y="301320"/>
-            <a:ext cx="9070560" cy="703440"/>
+            <a:ext cx="9069840" cy="702720"/>
           </a:xfrm>
           <a:prstGeom prst="rect">
             <a:avLst/>
@@ -4644,14 +6433,14 @@
       </p:sp>
       <p:sp>
         <p:nvSpPr>
-          <p:cNvPr id="121" name="CustomShape 2"/>
+          <p:cNvPr id="156" name="CustomShape 2"/>
           <p:cNvSpPr/>
           <p:nvPr/>
         </p:nvSpPr>
         <p:spPr>
           <a:xfrm>
             <a:off x="457200" y="1920240"/>
-            <a:ext cx="9051480" cy="5775120"/>
+            <a:ext cx="9050760" cy="5774400"/>
           </a:xfrm>
           <a:prstGeom prst="rect">
             <a:avLst/>
@@ -4741,159 +6530,6 @@
             </a:endParaRPr>
           </a:p>
           <a:p>
-            <a:r>
-              <a:rPr b="0" lang="en-US" sz="3200" spc="-1" strike="noStrike">
-                <a:solidFill>
-                  <a:srgbClr val="3c2154"/>
-                </a:solidFill>
-                <a:uFill>
-                  <a:solidFill>
-                    <a:srgbClr val="ffffff"/>
-                  </a:solidFill>
-                </a:uFill>
-                <a:latin typeface="Verdana"/>
-                <a:ea typeface="DejaVu Sans"/>
-              </a:rPr>
-              <a:t>Poetry: $300,000 </a:t>
-            </a:r>
-            <a:endParaRPr b="0" lang="en-US" sz="1800" spc="-1" strike="noStrike">
-              <a:solidFill>
-                <a:srgbClr val="000000"/>
-              </a:solidFill>
-              <a:uFill>
-                <a:solidFill>
-                  <a:srgbClr val="ffffff"/>
-                </a:solidFill>
-              </a:uFill>
-              <a:latin typeface="Arial"/>
-            </a:endParaRPr>
-          </a:p>
-          <a:p>
-            <a:r>
-              <a:rPr b="0" lang="en-US" sz="3200" spc="-1" strike="noStrike">
-                <a:solidFill>
-                  <a:srgbClr val="3c2154"/>
-                </a:solidFill>
-                <a:uFill>
-                  <a:solidFill>
-                    <a:srgbClr val="ffffff"/>
-                  </a:solidFill>
-                </a:uFill>
-                <a:latin typeface="Verdana"/>
-                <a:ea typeface="DejaVu Sans"/>
-              </a:rPr>
-              <a:t>Anthologies: $500,000</a:t>
-            </a:r>
-            <a:endParaRPr b="0" lang="en-US" sz="1800" spc="-1" strike="noStrike">
-              <a:solidFill>
-                <a:srgbClr val="000000"/>
-              </a:solidFill>
-              <a:uFill>
-                <a:solidFill>
-                  <a:srgbClr val="ffffff"/>
-                </a:solidFill>
-              </a:uFill>
-              <a:latin typeface="Arial"/>
-            </a:endParaRPr>
-          </a:p>
-          <a:p>
-            <a:r>
-              <a:rPr b="0" lang="en-US" sz="3200" spc="-1" strike="noStrike">
-                <a:solidFill>
-                  <a:srgbClr val="3c2154"/>
-                </a:solidFill>
-                <a:uFill>
-                  <a:solidFill>
-                    <a:srgbClr val="ffffff"/>
-                  </a:solidFill>
-                </a:uFill>
-                <a:latin typeface="Verdana"/>
-                <a:ea typeface="DejaVu Sans"/>
-              </a:rPr>
-              <a:t>Art books: $4m</a:t>
-            </a:r>
-            <a:endParaRPr b="0" lang="en-US" sz="1800" spc="-1" strike="noStrike">
-              <a:solidFill>
-                <a:srgbClr val="000000"/>
-              </a:solidFill>
-              <a:uFill>
-                <a:solidFill>
-                  <a:srgbClr val="ffffff"/>
-                </a:solidFill>
-              </a:uFill>
-              <a:latin typeface="Arial"/>
-            </a:endParaRPr>
-          </a:p>
-          <a:p>
-            <a:endParaRPr b="0" lang="en-US" sz="1800" spc="-1" strike="noStrike">
-              <a:solidFill>
-                <a:srgbClr val="000000"/>
-              </a:solidFill>
-              <a:uFill>
-                <a:solidFill>
-                  <a:srgbClr val="ffffff"/>
-                </a:solidFill>
-              </a:uFill>
-              <a:latin typeface="Arial"/>
-            </a:endParaRPr>
-          </a:p>
-          <a:p>
-            <a:r>
-              <a:rPr b="0" lang="en-US" sz="3200" spc="-1" strike="noStrike">
-                <a:solidFill>
-                  <a:srgbClr val="3c2154"/>
-                </a:solidFill>
-                <a:uFill>
-                  <a:solidFill>
-                    <a:srgbClr val="ffffff"/>
-                  </a:solidFill>
-                </a:uFill>
-                <a:latin typeface="Verdana"/>
-                <a:ea typeface="DejaVu Sans"/>
-              </a:rPr>
-              <a:t>Self published books on Amazon</a:t>
-            </a:r>
-            <a:endParaRPr b="0" lang="en-US" sz="1800" spc="-1" strike="noStrike">
-              <a:solidFill>
-                <a:srgbClr val="000000"/>
-              </a:solidFill>
-              <a:uFill>
-                <a:solidFill>
-                  <a:srgbClr val="ffffff"/>
-                </a:solidFill>
-              </a:uFill>
-              <a:latin typeface="Arial"/>
-            </a:endParaRPr>
-          </a:p>
-          <a:p>
-            <a:endParaRPr b="0" lang="en-US" sz="1800" spc="-1" strike="noStrike">
-              <a:solidFill>
-                <a:srgbClr val="000000"/>
-              </a:solidFill>
-              <a:uFill>
-                <a:solidFill>
-                  <a:srgbClr val="ffffff"/>
-                </a:solidFill>
-              </a:uFill>
-              <a:latin typeface="Arial"/>
-            </a:endParaRPr>
-          </a:p>
-          <a:p>
-            <a:r>
-              <a:rPr b="0" lang="en-US" sz="3200" spc="-1" strike="noStrike">
-                <a:solidFill>
-                  <a:srgbClr val="3c2154"/>
-                </a:solidFill>
-                <a:uFill>
-                  <a:solidFill>
-                    <a:srgbClr val="ffffff"/>
-                  </a:solidFill>
-                </a:uFill>
-                <a:latin typeface="Verdana"/>
-                <a:ea typeface="DejaVu Sans"/>
-              </a:rPr>
-              <a:t>727000 Self-Published in 2015 in US</a:t>
-            </a:r>
             <a:endParaRPr b="0" lang="en-US" sz="1800" spc="-1" strike="noStrike">
               <a:solidFill>
                 <a:srgbClr val="000000"/>
@@ -4936,7 +6572,7 @@
       </p:sp>
       <p:pic>
         <p:nvPicPr>
-          <p:cNvPr id="122" name="" descr=""/>
+          <p:cNvPr id="157" name="" descr=""/>
           <p:cNvPicPr/>
           <p:nvPr/>
         </p:nvPicPr>
@@ -4947,7 +6583,7 @@
         <p:spPr>
           <a:xfrm>
             <a:off x="7955280" y="301320"/>
-            <a:ext cx="1903320" cy="1903320"/>
+            <a:ext cx="1902600" cy="1902600"/>
           </a:xfrm>
           <a:prstGeom prst="rect">
             <a:avLst/>
@@ -4959,6 +6595,33 @@
       </p:pic>
     </p:spTree>
   </p:cSld>
+  <p:timing>
+    <p:tnLst>
+      <p:par>
+        <p:cTn id="23" dur="indefinite" restart="never" nodeType="tmRoot">
+          <p:childTnLst>
+            <p:seq>
+              <p:cTn id="24" nodeType="mainSeq"/>
+              <p:prevCondLst>
+                <p:cond delay="0" evt="onPrev">
+                  <p:tgtEl>
+                    <p:sldTgt/>
+                  </p:tgtEl>
+                </p:cond>
+              </p:prevCondLst>
+              <p:nextCondLst>
+                <p:cond delay="0" evt="onNext">
+                  <p:tgtEl>
+                    <p:sldTgt/>
+                  </p:tgtEl>
+                </p:cond>
+              </p:nextCondLst>
+            </p:seq>
+          </p:childTnLst>
+        </p:cTn>
+      </p:par>
+    </p:tnLst>
+  </p:timing>
 </p:sld>
 </file>
 
@@ -4981,14 +6644,14 @@
       </p:grpSpPr>
       <p:sp>
         <p:nvSpPr>
-          <p:cNvPr id="123" name="CustomShape 1"/>
+          <p:cNvPr id="158" name="CustomShape 1"/>
           <p:cNvSpPr/>
           <p:nvPr/>
         </p:nvSpPr>
         <p:spPr>
           <a:xfrm>
             <a:off x="504000" y="301320"/>
-            <a:ext cx="7815960" cy="886320"/>
+            <a:ext cx="7815240" cy="885600"/>
           </a:xfrm>
           <a:prstGeom prst="rect">
             <a:avLst/>
@@ -5038,7 +6701,7 @@
       </p:sp>
       <p:pic>
         <p:nvPicPr>
-          <p:cNvPr id="124" name="" descr=""/>
+          <p:cNvPr id="159" name="" descr=""/>
           <p:cNvPicPr/>
           <p:nvPr/>
         </p:nvPicPr>
@@ -5049,7 +6712,7 @@
         <p:spPr>
           <a:xfrm>
             <a:off x="3011760" y="1371600"/>
-            <a:ext cx="6131160" cy="752760"/>
+            <a:ext cx="6130440" cy="752040"/>
           </a:xfrm>
           <a:prstGeom prst="rect">
             <a:avLst/>
@@ -5061,7 +6724,7 @@
       </p:pic>
       <p:pic>
         <p:nvPicPr>
-          <p:cNvPr id="125" name="" descr=""/>
+          <p:cNvPr id="160" name="" descr=""/>
           <p:cNvPicPr/>
           <p:nvPr/>
         </p:nvPicPr>
@@ -5071,8 +6734,8 @@
         </p:blipFill>
         <p:spPr>
           <a:xfrm>
-            <a:off x="3017520" y="4075560"/>
-            <a:ext cx="4479480" cy="1866960"/>
+            <a:off x="-12240" y="2103480"/>
+            <a:ext cx="4308120" cy="2260800"/>
           </a:xfrm>
           <a:prstGeom prst="rect">
             <a:avLst/>
@@ -5084,7 +6747,7 @@
       </p:pic>
       <p:pic>
         <p:nvPicPr>
-          <p:cNvPr id="126" name="" descr=""/>
+          <p:cNvPr id="161" name="" descr=""/>
           <p:cNvPicPr/>
           <p:nvPr/>
         </p:nvPicPr>
@@ -5094,8 +6757,8 @@
         </p:blipFill>
         <p:spPr>
           <a:xfrm>
-            <a:off x="-12240" y="2103480"/>
-            <a:ext cx="4308840" cy="2261520"/>
+            <a:off x="6218280" y="2651760"/>
+            <a:ext cx="3150720" cy="1521720"/>
           </a:xfrm>
           <a:prstGeom prst="rect">
             <a:avLst/>
@@ -5107,7 +6770,7 @@
       </p:pic>
       <p:pic>
         <p:nvPicPr>
-          <p:cNvPr id="127" name="" descr=""/>
+          <p:cNvPr id="162" name="" descr=""/>
           <p:cNvPicPr/>
           <p:nvPr/>
         </p:nvPicPr>
@@ -5117,8 +6780,8 @@
         </p:blipFill>
         <p:spPr>
           <a:xfrm>
-            <a:off x="6218280" y="2651760"/>
-            <a:ext cx="3151440" cy="1522440"/>
+            <a:off x="-91440" y="4419360"/>
+            <a:ext cx="4844520" cy="3228840"/>
           </a:xfrm>
           <a:prstGeom prst="rect">
             <a:avLst/>
@@ -5128,54 +6791,35 @@
           </a:ln>
         </p:spPr>
       </p:pic>
-      <p:pic>
-        <p:nvPicPr>
-          <p:cNvPr id="128" name="" descr=""/>
-          <p:cNvPicPr/>
-          <p:nvPr/>
-        </p:nvPicPr>
-        <p:blipFill>
-          <a:blip r:embed="rId5"/>
-          <a:stretch/>
-        </p:blipFill>
-        <p:spPr>
-          <a:xfrm>
-            <a:off x="-91440" y="4419360"/>
-            <a:ext cx="4845240" cy="3229560"/>
-          </a:xfrm>
-          <a:prstGeom prst="rect">
-            <a:avLst/>
-          </a:prstGeom>
-          <a:ln>
-            <a:noFill/>
-          </a:ln>
-        </p:spPr>
-      </p:pic>
-      <p:pic>
-        <p:nvPicPr>
-          <p:cNvPr id="129" name="" descr=""/>
-          <p:cNvPicPr/>
-          <p:nvPr/>
-        </p:nvPicPr>
-        <p:blipFill>
-          <a:blip r:embed="rId6"/>
-          <a:stretch/>
-        </p:blipFill>
-        <p:spPr>
-          <a:xfrm>
-            <a:off x="6576480" y="5759280"/>
-            <a:ext cx="2475000" cy="1189080"/>
-          </a:xfrm>
-          <a:prstGeom prst="rect">
-            <a:avLst/>
-          </a:prstGeom>
-          <a:ln>
-            <a:noFill/>
-          </a:ln>
-        </p:spPr>
-      </p:pic>
     </p:spTree>
   </p:cSld>
+  <p:timing>
+    <p:tnLst>
+      <p:par>
+        <p:cTn id="25" dur="indefinite" restart="never" nodeType="tmRoot">
+          <p:childTnLst>
+            <p:seq>
+              <p:cTn id="26" nodeType="mainSeq"/>
+              <p:prevCondLst>
+                <p:cond delay="0" evt="onPrev">
+                  <p:tgtEl>
+                    <p:sldTgt/>
+                  </p:tgtEl>
+                </p:cond>
+              </p:prevCondLst>
+              <p:nextCondLst>
+                <p:cond delay="0" evt="onNext">
+                  <p:tgtEl>
+                    <p:sldTgt/>
+                  </p:tgtEl>
+                </p:cond>
+              </p:nextCondLst>
+            </p:seq>
+          </p:childTnLst>
+        </p:cTn>
+      </p:par>
+    </p:tnLst>
+  </p:timing>
 </p:sld>
 </file>
 
@@ -5198,14 +6842,14 @@
       </p:grpSpPr>
       <p:sp>
         <p:nvSpPr>
-          <p:cNvPr id="74" name="CustomShape 1"/>
+          <p:cNvPr id="110" name="CustomShape 1"/>
           <p:cNvSpPr/>
           <p:nvPr/>
         </p:nvSpPr>
         <p:spPr>
           <a:xfrm>
             <a:off x="504000" y="301320"/>
-            <a:ext cx="9070560" cy="1261080"/>
+            <a:ext cx="9069840" cy="1260360"/>
           </a:xfrm>
           <a:prstGeom prst="rect">
             <a:avLst/>
@@ -5255,14 +6899,14 @@
       </p:sp>
       <p:sp>
         <p:nvSpPr>
-          <p:cNvPr id="75" name="CustomShape 2"/>
+          <p:cNvPr id="111" name="CustomShape 2"/>
           <p:cNvSpPr/>
           <p:nvPr/>
         </p:nvSpPr>
         <p:spPr>
           <a:xfrm>
             <a:off x="504000" y="1769040"/>
-            <a:ext cx="9070560" cy="4383360"/>
+            <a:ext cx="9069840" cy="4382640"/>
           </a:xfrm>
           <a:prstGeom prst="rect">
             <a:avLst/>
@@ -5294,7 +6938,7 @@
                 <a:latin typeface="Verdana"/>
                 <a:ea typeface="DejaVu Sans"/>
               </a:rPr>
-              <a:t>Book authors are being undervalued by current online selling practices</a:t>
+              <a:t>Actors are being undervalued by current online selling practices</a:t>
             </a:r>
             <a:endParaRPr b="0" lang="en-US" sz="1800" spc="-1" strike="noStrike">
               <a:solidFill>
@@ -5335,7 +6979,7 @@
                 <a:latin typeface="Verdana"/>
                 <a:ea typeface="DejaVu Sans"/>
               </a:rPr>
-              <a:t>Most places that sell authors’ products only offer the books</a:t>
+              <a:t>Actors are missing out on opportunities to sell themselves</a:t>
             </a:r>
             <a:endParaRPr b="0" lang="en-US" sz="1800" spc="-1" strike="noStrike">
               <a:solidFill>
@@ -5443,14 +7087,14 @@
       </p:grpSpPr>
       <p:sp>
         <p:nvSpPr>
-          <p:cNvPr id="76" name="CustomShape 1"/>
+          <p:cNvPr id="112" name="CustomShape 1"/>
           <p:cNvSpPr/>
           <p:nvPr/>
         </p:nvSpPr>
         <p:spPr>
           <a:xfrm>
             <a:off x="478440" y="209880"/>
-            <a:ext cx="3360960" cy="1261080"/>
+            <a:ext cx="3360240" cy="1260360"/>
           </a:xfrm>
           <a:prstGeom prst="rect">
             <a:avLst/>
@@ -5505,14 +7149,14 @@
       </p:sp>
       <p:sp>
         <p:nvSpPr>
-          <p:cNvPr id="77" name="CustomShape 2"/>
+          <p:cNvPr id="113" name="CustomShape 2"/>
           <p:cNvSpPr/>
           <p:nvPr/>
         </p:nvSpPr>
         <p:spPr>
           <a:xfrm>
             <a:off x="365760" y="1828800"/>
-            <a:ext cx="8777160" cy="1553400"/>
+            <a:ext cx="8776440" cy="1552680"/>
           </a:xfrm>
           <a:prstGeom prst="rect">
             <a:avLst/>
@@ -5549,7 +7193,7 @@
                 <a:latin typeface="Verdana"/>
                 <a:ea typeface="DejaVu Sans"/>
               </a:rPr>
-              <a:t>Web platform that helps actors, authors, and filmmakers: </a:t>
+              <a:t>Web platform that helps actors: </a:t>
             </a:r>
             <a:endParaRPr b="0" lang="en-US" sz="1800" spc="-1" strike="noStrike">
               <a:solidFill>
@@ -5567,14 +7211,14 @@
       </p:sp>
       <p:sp>
         <p:nvSpPr>
-          <p:cNvPr id="78" name="CustomShape 3"/>
+          <p:cNvPr id="114" name="CustomShape 3"/>
           <p:cNvSpPr/>
           <p:nvPr/>
         </p:nvSpPr>
         <p:spPr>
           <a:xfrm>
             <a:off x="3474720" y="3657600"/>
-            <a:ext cx="2650680" cy="2467800"/>
+            <a:ext cx="2649960" cy="2467080"/>
           </a:xfrm>
           <a:prstGeom prst="rect">
             <a:avLst/>
@@ -5597,14 +7241,14 @@
       </p:sp>
       <p:sp>
         <p:nvSpPr>
-          <p:cNvPr id="79" name="CustomShape 4"/>
+          <p:cNvPr id="115" name="CustomShape 4"/>
           <p:cNvSpPr/>
           <p:nvPr/>
         </p:nvSpPr>
         <p:spPr>
           <a:xfrm>
             <a:off x="3571560" y="3931920"/>
-            <a:ext cx="2454840" cy="1815840"/>
+            <a:ext cx="2454120" cy="1815120"/>
           </a:xfrm>
           <a:prstGeom prst="rect">
             <a:avLst/>
@@ -5659,14 +7303,14 @@
       </p:sp>
       <p:sp>
         <p:nvSpPr>
-          <p:cNvPr id="80" name="CustomShape 5"/>
+          <p:cNvPr id="116" name="CustomShape 5"/>
           <p:cNvSpPr/>
           <p:nvPr/>
         </p:nvSpPr>
         <p:spPr>
           <a:xfrm>
             <a:off x="182880" y="3657600"/>
-            <a:ext cx="2925000" cy="2467800"/>
+            <a:ext cx="2924280" cy="2467080"/>
           </a:xfrm>
           <a:prstGeom prst="rect">
             <a:avLst/>
@@ -5689,14 +7333,14 @@
       </p:sp>
       <p:sp>
         <p:nvSpPr>
-          <p:cNvPr id="81" name="CustomShape 6"/>
+          <p:cNvPr id="117" name="CustomShape 6"/>
           <p:cNvSpPr/>
           <p:nvPr/>
         </p:nvSpPr>
         <p:spPr>
           <a:xfrm>
             <a:off x="365760" y="3931920"/>
-            <a:ext cx="2742120" cy="1815840"/>
+            <a:ext cx="2741400" cy="1815120"/>
           </a:xfrm>
           <a:prstGeom prst="rect">
             <a:avLst/>
@@ -5733,7 +7377,7 @@
                 <a:latin typeface="Verdana"/>
                 <a:ea typeface="DejaVu Sans"/>
               </a:rPr>
-              <a:t>Sell before they post on sites offering less</a:t>
+              <a:t>Engage with fans</a:t>
             </a:r>
             <a:endParaRPr b="0" lang="en-US" sz="1800" spc="-1" strike="noStrike">
               <a:solidFill>
@@ -5751,14 +7395,14 @@
       </p:sp>
       <p:sp>
         <p:nvSpPr>
-          <p:cNvPr id="82" name="CustomShape 7"/>
+          <p:cNvPr id="118" name="CustomShape 7"/>
           <p:cNvSpPr/>
           <p:nvPr/>
         </p:nvSpPr>
         <p:spPr>
           <a:xfrm>
             <a:off x="6492240" y="3657600"/>
-            <a:ext cx="2742120" cy="2467800"/>
+            <a:ext cx="2741400" cy="2467080"/>
           </a:xfrm>
           <a:prstGeom prst="rect">
             <a:avLst/>
@@ -5781,14 +7425,14 @@
       </p:sp>
       <p:sp>
         <p:nvSpPr>
-          <p:cNvPr id="83" name="CustomShape 8"/>
+          <p:cNvPr id="119" name="CustomShape 8"/>
           <p:cNvSpPr/>
           <p:nvPr/>
         </p:nvSpPr>
         <p:spPr>
           <a:xfrm>
             <a:off x="6554160" y="3677040"/>
-            <a:ext cx="2625120" cy="1815840"/>
+            <a:ext cx="2624400" cy="1815120"/>
           </a:xfrm>
           <a:prstGeom prst="rect">
             <a:avLst/>
@@ -5892,14 +7536,14 @@
       </p:grpSpPr>
       <p:sp>
         <p:nvSpPr>
-          <p:cNvPr id="84" name="CustomShape 1"/>
+          <p:cNvPr id="120" name="CustomShape 1"/>
           <p:cNvSpPr/>
           <p:nvPr/>
         </p:nvSpPr>
         <p:spPr>
           <a:xfrm>
             <a:off x="6583680" y="103320"/>
-            <a:ext cx="3356640" cy="1267200"/>
+            <a:ext cx="3355920" cy="1266480"/>
           </a:xfrm>
           <a:prstGeom prst="rect">
             <a:avLst/>
@@ -5946,7 +7590,7 @@
                 <a:latin typeface="Verdana"/>
                 <a:ea typeface="DejaVu Sans"/>
               </a:rPr>
-              <a:t>(for artists)</a:t>
+              <a:t>(for actors)</a:t>
             </a:r>
             <a:endParaRPr b="0" lang="en-US" sz="1800" spc="-1" strike="noStrike">
               <a:solidFill>
@@ -5962,39 +7606,16 @@
           </a:p>
         </p:txBody>
       </p:sp>
-      <p:pic>
-        <p:nvPicPr>
-          <p:cNvPr id="85" name="" descr=""/>
-          <p:cNvPicPr/>
-          <p:nvPr/>
-        </p:nvPicPr>
-        <p:blipFill>
-          <a:blip r:embed="rId1"/>
-          <a:stretch/>
-        </p:blipFill>
-        <p:spPr>
-          <a:xfrm>
-            <a:off x="-182880" y="-437760"/>
-            <a:ext cx="6287400" cy="3536280"/>
-          </a:xfrm>
-          <a:prstGeom prst="rect">
-            <a:avLst/>
-          </a:prstGeom>
-          <a:ln>
-            <a:noFill/>
-          </a:ln>
-        </p:spPr>
-      </p:pic>
-      <p:sp>
-        <p:nvSpPr>
-          <p:cNvPr id="86" name="CustomShape 2"/>
+      <p:sp>
+        <p:nvSpPr>
+          <p:cNvPr id="121" name="CustomShape 2"/>
           <p:cNvSpPr/>
           <p:nvPr/>
         </p:nvSpPr>
         <p:spPr>
           <a:xfrm>
             <a:off x="6468840" y="2011680"/>
-            <a:ext cx="3405600" cy="1279080"/>
+            <a:ext cx="3404880" cy="1278360"/>
           </a:xfrm>
           <a:prstGeom prst="rect">
             <a:avLst/>
@@ -6044,14 +7665,14 @@
       </p:sp>
       <p:sp>
         <p:nvSpPr>
-          <p:cNvPr id="87" name="CustomShape 3"/>
+          <p:cNvPr id="122" name="CustomShape 3"/>
           <p:cNvSpPr/>
           <p:nvPr/>
         </p:nvSpPr>
         <p:spPr>
           <a:xfrm>
             <a:off x="91440" y="4205160"/>
-            <a:ext cx="4590000" cy="1097280"/>
+            <a:ext cx="4589280" cy="1096560"/>
           </a:xfrm>
           <a:prstGeom prst="rect">
             <a:avLst/>
@@ -6101,14 +7722,14 @@
       </p:sp>
       <p:sp>
         <p:nvSpPr>
-          <p:cNvPr id="88" name="CustomShape 4"/>
+          <p:cNvPr id="123" name="CustomShape 4"/>
           <p:cNvSpPr/>
           <p:nvPr/>
         </p:nvSpPr>
         <p:spPr>
           <a:xfrm>
             <a:off x="274320" y="6234840"/>
-            <a:ext cx="4479480" cy="1170720"/>
+            <a:ext cx="4478760" cy="1170000"/>
           </a:xfrm>
           <a:prstGeom prst="rect">
             <a:avLst/>
@@ -6158,18 +7779,18 @@
       </p:sp>
       <p:pic>
         <p:nvPicPr>
-          <p:cNvPr id="89" name="" descr=""/>
+          <p:cNvPr id="124" name="" descr=""/>
           <p:cNvPicPr/>
           <p:nvPr/>
         </p:nvPicPr>
         <p:blipFill>
-          <a:blip r:embed="rId2"/>
+          <a:blip r:embed="rId1"/>
           <a:stretch/>
         </p:blipFill>
         <p:spPr>
           <a:xfrm>
             <a:off x="4846320" y="3052080"/>
-            <a:ext cx="5135760" cy="4042080"/>
+            <a:ext cx="5135040" cy="4041360"/>
           </a:xfrm>
           <a:prstGeom prst="rect">
             <a:avLst/>
@@ -6230,14 +7851,14 @@
       </p:grpSpPr>
       <p:sp>
         <p:nvSpPr>
-          <p:cNvPr id="90" name="CustomShape 1"/>
+          <p:cNvPr id="125" name="CustomShape 1"/>
           <p:cNvSpPr/>
           <p:nvPr/>
         </p:nvSpPr>
         <p:spPr>
           <a:xfrm>
             <a:off x="504000" y="301320"/>
-            <a:ext cx="9070560" cy="1261080"/>
+            <a:ext cx="9069840" cy="1260360"/>
           </a:xfrm>
           <a:prstGeom prst="rect">
             <a:avLst/>
@@ -6302,14 +7923,14 @@
       </p:sp>
       <p:sp>
         <p:nvSpPr>
-          <p:cNvPr id="91" name="CustomShape 2"/>
+          <p:cNvPr id="126" name="CustomShape 2"/>
           <p:cNvSpPr/>
           <p:nvPr/>
         </p:nvSpPr>
         <p:spPr>
           <a:xfrm>
             <a:off x="163440" y="1769040"/>
-            <a:ext cx="9070560" cy="4383360"/>
+            <a:ext cx="9069840" cy="4382640"/>
           </a:xfrm>
           <a:prstGeom prst="rect">
             <a:avLst/>
@@ -6341,7 +7962,7 @@
                 <a:latin typeface="Verdana"/>
                 <a:ea typeface="DejaVu Sans"/>
               </a:rPr>
-              <a:t>Fan goes to author or org page</a:t>
+              <a:t>Fan goes to actor or org page</a:t>
             </a:r>
             <a:endParaRPr b="0" lang="en-US" sz="1800" spc="-1" strike="noStrike">
               <a:solidFill>
@@ -6482,7 +8103,7 @@
       </p:sp>
       <p:pic>
         <p:nvPicPr>
-          <p:cNvPr id="92" name="" descr=""/>
+          <p:cNvPr id="127" name="" descr=""/>
           <p:cNvPicPr/>
           <p:nvPr/>
         </p:nvPicPr>
@@ -6493,7 +8114,7 @@
         <p:spPr>
           <a:xfrm>
             <a:off x="7513920" y="4679280"/>
-            <a:ext cx="1903320" cy="1903320"/>
+            <a:ext cx="1902600" cy="1902600"/>
           </a:xfrm>
           <a:prstGeom prst="rect">
             <a:avLst/>
@@ -6554,14 +8175,14 @@
       </p:grpSpPr>
       <p:sp>
         <p:nvSpPr>
-          <p:cNvPr id="93" name="CustomShape 1"/>
+          <p:cNvPr id="128" name="CustomShape 1"/>
           <p:cNvSpPr/>
           <p:nvPr/>
         </p:nvSpPr>
         <p:spPr>
           <a:xfrm>
             <a:off x="504000" y="301320"/>
-            <a:ext cx="7815960" cy="1618920"/>
+            <a:ext cx="7815240" cy="1618200"/>
           </a:xfrm>
           <a:prstGeom prst="rect">
             <a:avLst/>
@@ -6593,7 +8214,7 @@
                 <a:latin typeface="Verdana"/>
                 <a:ea typeface="DejaVu Sans"/>
               </a:rPr>
-              <a:t>How much will all this cost me?</a:t>
+              <a:t>How much will all this cost actors?</a:t>
             </a:r>
             <a:endParaRPr b="0" lang="en-US" sz="1800" spc="-1" strike="noStrike">
               <a:solidFill>
@@ -6611,14 +8232,14 @@
       </p:sp>
       <p:sp>
         <p:nvSpPr>
-          <p:cNvPr id="94" name="CustomShape 2"/>
+          <p:cNvPr id="129" name="CustomShape 2"/>
           <p:cNvSpPr/>
           <p:nvPr/>
         </p:nvSpPr>
         <p:spPr>
           <a:xfrm>
             <a:off x="914400" y="2651760"/>
-            <a:ext cx="7313760" cy="731520"/>
+            <a:ext cx="7313040" cy="730800"/>
           </a:xfrm>
           <a:prstGeom prst="rect">
             <a:avLst/>
@@ -6655,7 +8276,7 @@
                 <a:latin typeface="Verdana"/>
                 <a:ea typeface="DejaVu Sans"/>
               </a:rPr>
-              <a:t>We take 5% commission from artist sales on the site.</a:t>
+              <a:t>We take 5% commission from actors’ sales on the site.</a:t>
             </a:r>
             <a:endParaRPr b="0" lang="en-US" sz="1800" spc="-1" strike="noStrike">
               <a:solidFill>
@@ -6724,7 +8345,7 @@
       </p:sp>
       <p:pic>
         <p:nvPicPr>
-          <p:cNvPr id="95" name="" descr=""/>
+          <p:cNvPr id="130" name="" descr=""/>
           <p:cNvPicPr/>
           <p:nvPr/>
         </p:nvPicPr>
@@ -6735,7 +8356,7 @@
         <p:spPr>
           <a:xfrm>
             <a:off x="7606440" y="5137560"/>
-            <a:ext cx="1903320" cy="1903320"/>
+            <a:ext cx="1902600" cy="1902600"/>
           </a:xfrm>
           <a:prstGeom prst="rect">
             <a:avLst/>
@@ -6796,14 +8417,14 @@
       </p:grpSpPr>
       <p:sp>
         <p:nvSpPr>
-          <p:cNvPr id="96" name="CustomShape 1"/>
+          <p:cNvPr id="131" name="CustomShape 1"/>
           <p:cNvSpPr/>
           <p:nvPr/>
         </p:nvSpPr>
         <p:spPr>
           <a:xfrm>
             <a:off x="504000" y="301320"/>
-            <a:ext cx="9188640" cy="1344600"/>
+            <a:ext cx="9187920" cy="1343880"/>
           </a:xfrm>
           <a:prstGeom prst="rect">
             <a:avLst/>
@@ -6835,7 +8456,7 @@
                 <a:latin typeface="Verdana"/>
                 <a:ea typeface="DejaVu Sans"/>
               </a:rPr>
-              <a:t>What you can look forward to</a:t>
+              <a:t>What actors and fans can look forward to</a:t>
             </a:r>
             <a:endParaRPr b="0" lang="en-US" sz="1800" spc="-1" strike="noStrike">
               <a:solidFill>
@@ -6853,14 +8474,14 @@
       </p:sp>
       <p:sp>
         <p:nvSpPr>
-          <p:cNvPr id="97" name="CustomShape 2"/>
+          <p:cNvPr id="132" name="CustomShape 2"/>
           <p:cNvSpPr/>
           <p:nvPr/>
         </p:nvSpPr>
         <p:spPr>
           <a:xfrm>
             <a:off x="914400" y="1441440"/>
-            <a:ext cx="7313760" cy="5679360"/>
+            <a:ext cx="7313040" cy="5678640"/>
           </a:xfrm>
           <a:prstGeom prst="rect">
             <a:avLst/>
@@ -6981,7 +8602,7 @@
                 <a:latin typeface="Verdana"/>
                 <a:ea typeface="DejaVu Sans"/>
               </a:rPr>
-              <a:t>Authors</a:t>
+              <a:t>Actors</a:t>
             </a:r>
             <a:r>
               <a:rPr b="0" lang="en-US" sz="2400" spc="-1" strike="noStrike">
@@ -7344,7 +8965,7 @@
       </p:sp>
       <p:pic>
         <p:nvPicPr>
-          <p:cNvPr id="98" name="" descr=""/>
+          <p:cNvPr id="133" name="" descr=""/>
           <p:cNvPicPr/>
           <p:nvPr/>
         </p:nvPicPr>
@@ -7355,7 +8976,7 @@
         <p:spPr>
           <a:xfrm>
             <a:off x="7513920" y="4679280"/>
-            <a:ext cx="1903320" cy="1903320"/>
+            <a:ext cx="1902600" cy="1902600"/>
           </a:xfrm>
           <a:prstGeom prst="rect">
             <a:avLst/>
@@ -7367,6 +8988,33 @@
       </p:pic>
     </p:spTree>
   </p:cSld>
+  <p:timing>
+    <p:tnLst>
+      <p:par>
+        <p:cTn id="13" dur="indefinite" restart="never" nodeType="tmRoot">
+          <p:childTnLst>
+            <p:seq>
+              <p:cTn id="14" nodeType="mainSeq"/>
+              <p:prevCondLst>
+                <p:cond delay="0" evt="onPrev">
+                  <p:tgtEl>
+                    <p:sldTgt/>
+                  </p:tgtEl>
+                </p:cond>
+              </p:prevCondLst>
+              <p:nextCondLst>
+                <p:cond delay="0" evt="onNext">
+                  <p:tgtEl>
+                    <p:sldTgt/>
+                  </p:tgtEl>
+                </p:cond>
+              </p:nextCondLst>
+            </p:seq>
+          </p:childTnLst>
+        </p:cTn>
+      </p:par>
+    </p:tnLst>
+  </p:timing>
 </p:sld>
 </file>
 
@@ -7389,14 +9037,14 @@
       </p:grpSpPr>
       <p:sp>
         <p:nvSpPr>
-          <p:cNvPr id="99" name="CustomShape 1"/>
+          <p:cNvPr id="134" name="CustomShape 1"/>
           <p:cNvSpPr/>
           <p:nvPr/>
         </p:nvSpPr>
         <p:spPr>
           <a:xfrm>
             <a:off x="457200" y="118440"/>
-            <a:ext cx="9600840" cy="887040"/>
+            <a:ext cx="9600120" cy="886320"/>
           </a:xfrm>
           <a:prstGeom prst="rect">
             <a:avLst/>
@@ -7446,7 +9094,7 @@
       </p:sp>
       <p:pic>
         <p:nvPicPr>
-          <p:cNvPr id="100" name="" descr=""/>
+          <p:cNvPr id="135" name="" descr=""/>
           <p:cNvPicPr/>
           <p:nvPr/>
         </p:nvPicPr>
@@ -7457,7 +9105,7 @@
         <p:spPr>
           <a:xfrm>
             <a:off x="6417720" y="108360"/>
-            <a:ext cx="1903320" cy="1903320"/>
+            <a:ext cx="1902600" cy="1902600"/>
           </a:xfrm>
           <a:prstGeom prst="rect">
             <a:avLst/>
@@ -7469,14 +9117,14 @@
       </p:pic>
       <p:sp>
         <p:nvSpPr>
-          <p:cNvPr id="101" name="CustomShape 2"/>
+          <p:cNvPr id="136" name="CustomShape 2"/>
           <p:cNvSpPr/>
           <p:nvPr/>
         </p:nvSpPr>
         <p:spPr>
           <a:xfrm>
             <a:off x="4846320" y="6353280"/>
-            <a:ext cx="3033000" cy="987120"/>
+            <a:ext cx="3032280" cy="986400"/>
           </a:xfrm>
           <a:prstGeom prst="rect">
             <a:avLst/>
@@ -7564,14 +9212,14 @@
       </p:sp>
       <p:sp>
         <p:nvSpPr>
-          <p:cNvPr id="102" name="CustomShape 3"/>
+          <p:cNvPr id="137" name="CustomShape 3"/>
           <p:cNvSpPr/>
           <p:nvPr/>
         </p:nvSpPr>
         <p:spPr>
           <a:xfrm>
             <a:off x="182880" y="1103040"/>
-            <a:ext cx="2742120" cy="1736280"/>
+            <a:ext cx="2741400" cy="1735560"/>
           </a:xfrm>
           <a:prstGeom prst="rect">
             <a:avLst/>
@@ -7594,14 +9242,14 @@
       </p:sp>
       <p:sp>
         <p:nvSpPr>
-          <p:cNvPr id="103" name="CustomShape 4"/>
+          <p:cNvPr id="138" name="CustomShape 4"/>
           <p:cNvSpPr/>
           <p:nvPr/>
         </p:nvSpPr>
         <p:spPr>
           <a:xfrm>
             <a:off x="346320" y="1194480"/>
-            <a:ext cx="2487240" cy="1481040"/>
+            <a:ext cx="2486520" cy="1480320"/>
           </a:xfrm>
           <a:prstGeom prst="rect">
             <a:avLst/>
@@ -7638,7 +9286,7 @@
                 <a:latin typeface="Verdana"/>
                 <a:ea typeface="DejaVu Sans"/>
               </a:rPr>
-              <a:t>Work one on one with artists</a:t>
+              <a:t>Work one on one with actors</a:t>
             </a:r>
             <a:endParaRPr b="0" lang="en-US" sz="1800" spc="-1" strike="noStrike">
               <a:solidFill>
@@ -7656,7 +9304,7 @@
       </p:sp>
       <p:pic>
         <p:nvPicPr>
-          <p:cNvPr id="104" name="" descr=""/>
+          <p:cNvPr id="139" name="" descr=""/>
           <p:cNvPicPr/>
           <p:nvPr/>
         </p:nvPicPr>
@@ -7667,7 +9315,7 @@
         <p:spPr>
           <a:xfrm>
             <a:off x="1737360" y="3954960"/>
-            <a:ext cx="5393880" cy="1804680"/>
+            <a:ext cx="5393160" cy="1803960"/>
           </a:xfrm>
           <a:prstGeom prst="rect">
             <a:avLst/>
@@ -7679,14 +9327,14 @@
       </p:pic>
       <p:sp>
         <p:nvSpPr>
-          <p:cNvPr id="105" name="CustomShape 5"/>
+          <p:cNvPr id="140" name="CustomShape 5"/>
           <p:cNvSpPr/>
           <p:nvPr/>
         </p:nvSpPr>
         <p:spPr>
           <a:xfrm>
             <a:off x="2468880" y="2926080"/>
-            <a:ext cx="3930840" cy="1187640"/>
+            <a:ext cx="3930120" cy="1186920"/>
           </a:xfrm>
           <a:prstGeom prst="rect">
             <a:avLst/>
@@ -7741,6 +9389,33 @@
       </p:sp>
     </p:spTree>
   </p:cSld>
+  <p:timing>
+    <p:tnLst>
+      <p:par>
+        <p:cTn id="15" dur="indefinite" restart="never" nodeType="tmRoot">
+          <p:childTnLst>
+            <p:seq>
+              <p:cTn id="16" nodeType="mainSeq"/>
+              <p:prevCondLst>
+                <p:cond delay="0" evt="onPrev">
+                  <p:tgtEl>
+                    <p:sldTgt/>
+                  </p:tgtEl>
+                </p:cond>
+              </p:prevCondLst>
+              <p:nextCondLst>
+                <p:cond delay="0" evt="onNext">
+                  <p:tgtEl>
+                    <p:sldTgt/>
+                  </p:tgtEl>
+                </p:cond>
+              </p:nextCondLst>
+            </p:seq>
+          </p:childTnLst>
+        </p:cTn>
+      </p:par>
+    </p:tnLst>
+  </p:timing>
 </p:sld>
 </file>
 
@@ -7763,14 +9438,14 @@
       </p:grpSpPr>
       <p:sp>
         <p:nvSpPr>
-          <p:cNvPr id="106" name="CustomShape 1"/>
+          <p:cNvPr id="141" name="CustomShape 1"/>
           <p:cNvSpPr/>
           <p:nvPr/>
         </p:nvSpPr>
         <p:spPr>
           <a:xfrm>
             <a:off x="1005840" y="731520"/>
-            <a:ext cx="6217920" cy="822960"/>
+            <a:ext cx="6217200" cy="822240"/>
           </a:xfrm>
           <a:prstGeom prst="rect">
             <a:avLst/>
@@ -7820,14 +9495,14 @@
       </p:sp>
       <p:sp>
         <p:nvSpPr>
-          <p:cNvPr id="107" name="CustomShape 2"/>
+          <p:cNvPr id="142" name="CustomShape 2"/>
           <p:cNvSpPr/>
           <p:nvPr/>
         </p:nvSpPr>
         <p:spPr>
           <a:xfrm>
             <a:off x="274320" y="3017520"/>
-            <a:ext cx="9692640" cy="3980880"/>
+            <a:ext cx="9691920" cy="3980160"/>
           </a:xfrm>
           <a:prstGeom prst="rect">
             <a:avLst/>
@@ -7900,48 +9575,7 @@
                 <a:latin typeface="Verdana"/>
                 <a:ea typeface="DejaVu Sans"/>
               </a:rPr>
-              <a:t>Artists earn revenue for creative ways of engaging – Your fans pay YOU to advertise for your work </a:t>
-            </a:r>
-            <a:endParaRPr b="0" lang="en-US" sz="1800" spc="-1" strike="noStrike">
-              <a:solidFill>
-                <a:srgbClr val="000000"/>
-              </a:solidFill>
-              <a:uFill>
-                <a:solidFill>
-                  <a:srgbClr val="ffffff"/>
-                </a:solidFill>
-              </a:uFill>
-              <a:latin typeface="Arial"/>
-            </a:endParaRPr>
-          </a:p>
-          <a:p>
-            <a:endParaRPr b="0" lang="en-US" sz="1800" spc="-1" strike="noStrike">
-              <a:solidFill>
-                <a:srgbClr val="000000"/>
-              </a:solidFill>
-              <a:uFill>
-                <a:solidFill>
-                  <a:srgbClr val="ffffff"/>
-                </a:solidFill>
-              </a:uFill>
-              <a:latin typeface="Arial"/>
-            </a:endParaRPr>
-          </a:p>
-          <a:p>
-            <a:r>
-              <a:rPr b="0" lang="en-US" sz="2200" spc="-1" strike="noStrike">
-                <a:solidFill>
-                  <a:srgbClr val="3c2154"/>
-                </a:solidFill>
-                <a:uFill>
-                  <a:solidFill>
-                    <a:srgbClr val="ffffff"/>
-                  </a:solidFill>
-                </a:uFill>
-                <a:latin typeface="Verdana"/>
-                <a:ea typeface="DejaVu Sans"/>
-              </a:rPr>
-              <a:t>Rather than offering one book only every year or two, authors offer something once a month </a:t>
+              <a:t>Artists earn revenue for creative ways of engaging – Your fans pay YOU to tell their friends your work </a:t>
             </a:r>
             <a:endParaRPr b="0" lang="en-US" sz="1800" spc="-1" strike="noStrike">
               <a:solidFill>
@@ -8009,11 +9643,52 @@
               <a:latin typeface="Arial"/>
             </a:endParaRPr>
           </a:p>
+          <a:p>
+            <a:r>
+              <a:rPr b="0" lang="en-US" sz="2200" spc="-1" strike="noStrike">
+                <a:solidFill>
+                  <a:srgbClr val="3c2154"/>
+                </a:solidFill>
+                <a:uFill>
+                  <a:solidFill>
+                    <a:srgbClr val="ffffff"/>
+                  </a:solidFill>
+                </a:uFill>
+                <a:latin typeface="Verdana"/>
+                <a:ea typeface="DejaVu Sans"/>
+              </a:rPr>
+              <a:t>Not dependent on a project</a:t>
+            </a:r>
+            <a:endParaRPr b="0" lang="en-US" sz="1800" spc="-1" strike="noStrike">
+              <a:solidFill>
+                <a:srgbClr val="000000"/>
+              </a:solidFill>
+              <a:uFill>
+                <a:solidFill>
+                  <a:srgbClr val="ffffff"/>
+                </a:solidFill>
+              </a:uFill>
+              <a:latin typeface="Arial"/>
+            </a:endParaRPr>
+          </a:p>
+          <a:p>
+            <a:endParaRPr b="0" lang="en-US" sz="1800" spc="-1" strike="noStrike">
+              <a:solidFill>
+                <a:srgbClr val="000000"/>
+              </a:solidFill>
+              <a:uFill>
+                <a:solidFill>
+                  <a:srgbClr val="ffffff"/>
+                </a:solidFill>
+              </a:uFill>
+              <a:latin typeface="Arial"/>
+            </a:endParaRPr>
+          </a:p>
         </p:txBody>
       </p:sp>
       <p:pic>
         <p:nvPicPr>
-          <p:cNvPr id="108" name="" descr=""/>
+          <p:cNvPr id="143" name="" descr=""/>
           <p:cNvPicPr/>
           <p:nvPr/>
         </p:nvPicPr>
@@ -8024,7 +9699,7 @@
         <p:spPr>
           <a:xfrm>
             <a:off x="2652840" y="532080"/>
-            <a:ext cx="1263240" cy="1263240"/>
+            <a:ext cx="1262520" cy="1262520"/>
           </a:xfrm>
           <a:prstGeom prst="rect">
             <a:avLst/>
@@ -8036,6 +9711,33 @@
       </p:pic>
     </p:spTree>
   </p:cSld>
+  <p:timing>
+    <p:tnLst>
+      <p:par>
+        <p:cTn id="17" dur="indefinite" restart="never" nodeType="tmRoot">
+          <p:childTnLst>
+            <p:seq>
+              <p:cTn id="18" nodeType="mainSeq"/>
+              <p:prevCondLst>
+                <p:cond delay="0" evt="onPrev">
+                  <p:tgtEl>
+                    <p:sldTgt/>
+                  </p:tgtEl>
+                </p:cond>
+              </p:prevCondLst>
+              <p:nextCondLst>
+                <p:cond delay="0" evt="onNext">
+                  <p:tgtEl>
+                    <p:sldTgt/>
+                  </p:tgtEl>
+                </p:cond>
+              </p:nextCondLst>
+            </p:seq>
+          </p:childTnLst>
+        </p:cTn>
+      </p:par>
+    </p:tnLst>
+  </p:timing>
 </p:sld>
 </file>
 
@@ -8483,4 +10185,227 @@
     </a:fmtScheme>
   </a:themeElements>
 </a:theme>
+</file>
+
+<file path=ppt/theme/theme3.xml><?xml version="1.0" encoding="utf-8"?>
+<a:theme xmlns:a="http://schemas.openxmlformats.org/drawingml/2006/main" name="Office Theme">
+  <a:themeElements>
+    <a:clrScheme name="Office">
+      <a:dk1>
+        <a:sysClr val="windowText" lastClr="000000"/>
+      </a:dk1>
+      <a:lt1>
+        <a:sysClr val="window" lastClr="FFFFFF"/>
+      </a:lt1>
+      <a:dk2>
+        <a:srgbClr val="1F497D"/>
+      </a:dk2>
+      <a:lt2>
+        <a:srgbClr val="EEECE1"/>
+      </a:lt2>
+      <a:accent1>
+        <a:srgbClr val="4F81BD"/>
+      </a:accent1>
+      <a:accent2>
+        <a:srgbClr val="C0504D"/>
+      </a:accent2>
+      <a:accent3>
+        <a:srgbClr val="9BBB59"/>
+      </a:accent3>
+      <a:accent4>
+        <a:srgbClr val="8064A2"/>
+      </a:accent4>
+      <a:accent5>
+        <a:srgbClr val="4BACC6"/>
+      </a:accent5>
+      <a:accent6>
+        <a:srgbClr val="F79646"/>
+      </a:accent6>
+      <a:hlink>
+        <a:srgbClr val="0000FF"/>
+      </a:hlink>
+      <a:folHlink>
+        <a:srgbClr val="800080"/>
+      </a:folHlink>
+    </a:clrScheme>
+    <a:fontScheme name="Office">
+      <a:majorFont>
+        <a:latin typeface="Arial"/>
+        <a:ea typeface="DejaVu Sans"/>
+        <a:cs typeface="DejaVu Sans"/>
+      </a:majorFont>
+      <a:minorFont>
+        <a:latin typeface="Arial"/>
+        <a:ea typeface="DejaVu Sans"/>
+        <a:cs typeface="DejaVu Sans"/>
+      </a:minorFont>
+    </a:fontScheme>
+    <a:fmtScheme name="Office">
+      <a:fillStyleLst>
+        <a:solidFill>
+          <a:schemeClr val="phClr"/>
+        </a:solidFill>
+        <a:gradFill rotWithShape="1">
+          <a:gsLst>
+            <a:gs pos="0">
+              <a:schemeClr val="phClr">
+                <a:tint val="50000"/>
+                <a:satMod val="300000"/>
+              </a:schemeClr>
+            </a:gs>
+            <a:gs pos="35000">
+              <a:schemeClr val="phClr">
+                <a:tint val="37000"/>
+                <a:satMod val="300000"/>
+              </a:schemeClr>
+            </a:gs>
+            <a:gs pos="100000">
+              <a:schemeClr val="phClr">
+                <a:tint val="15000"/>
+                <a:satMod val="350000"/>
+              </a:schemeClr>
+            </a:gs>
+          </a:gsLst>
+          <a:lin ang="16200000" scaled="1"/>
+        </a:gradFill>
+        <a:gradFill rotWithShape="1">
+          <a:gsLst>
+            <a:gs pos="0">
+              <a:schemeClr val="phClr">
+                <a:shade val="51000"/>
+                <a:satMod val="130000"/>
+              </a:schemeClr>
+            </a:gs>
+            <a:gs pos="80000">
+              <a:schemeClr val="phClr">
+                <a:shade val="93000"/>
+                <a:satMod val="130000"/>
+              </a:schemeClr>
+            </a:gs>
+            <a:gs pos="100000">
+              <a:schemeClr val="phClr">
+                <a:shade val="94000"/>
+                <a:satMod val="135000"/>
+              </a:schemeClr>
+            </a:gs>
+          </a:gsLst>
+          <a:lin ang="16200000" scaled="0"/>
+        </a:gradFill>
+      </a:fillStyleLst>
+      <a:lnStyleLst>
+        <a:ln w="9525" cap="flat" cmpd="sng" algn="ctr">
+          <a:solidFill>
+            <a:schemeClr val="phClr">
+              <a:shade val="95000"/>
+              <a:satMod val="105000"/>
+            </a:schemeClr>
+          </a:solidFill>
+          <a:prstDash val="solid"/>
+        </a:ln>
+        <a:ln w="25400" cap="flat" cmpd="sng" algn="ctr">
+          <a:solidFill>
+            <a:schemeClr val="phClr"/>
+          </a:solidFill>
+          <a:prstDash val="solid"/>
+        </a:ln>
+        <a:ln w="38100" cap="flat" cmpd="sng" algn="ctr">
+          <a:solidFill>
+            <a:schemeClr val="phClr"/>
+          </a:solidFill>
+          <a:prstDash val="solid"/>
+        </a:ln>
+      </a:lnStyleLst>
+      <a:effectStyleLst>
+        <a:effectStyle>
+          <a:effectLst>
+            <a:outerShdw blurRad="40000" dist="20000" dir="5400000" rotWithShape="0">
+              <a:srgbClr val="000000">
+                <a:alpha val="38000"/>
+              </a:srgbClr>
+            </a:outerShdw>
+          </a:effectLst>
+        </a:effectStyle>
+        <a:effectStyle>
+          <a:effectLst>
+            <a:outerShdw blurRad="40000" dist="23000" dir="5400000" rotWithShape="0">
+              <a:srgbClr val="000000">
+                <a:alpha val="35000"/>
+              </a:srgbClr>
+            </a:outerShdw>
+          </a:effectLst>
+        </a:effectStyle>
+        <a:effectStyle>
+          <a:effectLst>
+            <a:outerShdw blurRad="40000" dist="23000" dir="5400000" rotWithShape="0">
+              <a:srgbClr val="000000">
+                <a:alpha val="35000"/>
+              </a:srgbClr>
+            </a:outerShdw>
+          </a:effectLst>
+          <a:scene3d>
+            <a:camera prst="orthographicFront">
+              <a:rot lat="0" lon="0" rev="0"/>
+            </a:camera>
+            <a:lightRig rig="threePt" dir="t">
+              <a:rot lat="0" lon="0" rev="1200000"/>
+            </a:lightRig>
+          </a:scene3d>
+          <a:sp3d>
+            <a:bevelT w="63500" h="25400"/>
+          </a:sp3d>
+        </a:effectStyle>
+      </a:effectStyleLst>
+      <a:bgFillStyleLst>
+        <a:solidFill>
+          <a:schemeClr val="phClr"/>
+        </a:solidFill>
+        <a:gradFill rotWithShape="1">
+          <a:gsLst>
+            <a:gs pos="0">
+              <a:schemeClr val="phClr">
+                <a:tint val="40000"/>
+                <a:satMod val="350000"/>
+              </a:schemeClr>
+            </a:gs>
+            <a:gs pos="40000">
+              <a:schemeClr val="phClr">
+                <a:tint val="45000"/>
+                <a:shade val="99000"/>
+                <a:satMod val="350000"/>
+              </a:schemeClr>
+            </a:gs>
+            <a:gs pos="100000">
+              <a:schemeClr val="phClr">
+                <a:shade val="20000"/>
+                <a:satMod val="255000"/>
+              </a:schemeClr>
+            </a:gs>
+          </a:gsLst>
+          <a:path path="circle">
+            <a:fillToRect l="50000" t="-80000" r="50000" b="180000"/>
+          </a:path>
+        </a:gradFill>
+        <a:gradFill rotWithShape="1">
+          <a:gsLst>
+            <a:gs pos="0">
+              <a:schemeClr val="phClr">
+                <a:tint val="80000"/>
+                <a:satMod val="300000"/>
+              </a:schemeClr>
+            </a:gs>
+            <a:gs pos="100000">
+              <a:schemeClr val="phClr">
+                <a:shade val="30000"/>
+                <a:satMod val="200000"/>
+              </a:schemeClr>
+            </a:gs>
+          </a:gsLst>
+          <a:path path="circle">
+            <a:fillToRect l="50000" t="50000" r="50000" b="50000"/>
+          </a:path>
+        </a:gradFill>
+      </a:bgFillStyleLst>
+    </a:fmtScheme>
+  </a:themeElements>
+</a:theme>
 </file>
</xml_diff>